<commit_message>
update to ppt presentation for spectral unmixing
</commit_message>
<xml_diff>
--- a/spectral-unmixing/ppt_presentations/midterm_project_report.pptx
+++ b/spectral-unmixing/ppt_presentations/midterm_project_report.pptx
@@ -7,6 +7,10 @@
   <p:sldIdLst>
     <p:sldId id="256" r:id="rId2"/>
     <p:sldId id="257" r:id="rId3"/>
+    <p:sldId id="258" r:id="rId4"/>
+    <p:sldId id="259" r:id="rId5"/>
+    <p:sldId id="260" r:id="rId6"/>
+    <p:sldId id="261" r:id="rId7"/>
   </p:sldIdLst>
   <p:sldSz cx="12192000" cy="6858000"/>
   <p:notesSz cx="6858000" cy="9144000"/>
@@ -105,6 +109,11 @@
       </a:defRPr>
     </a:lvl9pPr>
   </p:defaultTextStyle>
+  <p:extLst>
+    <p:ext uri="{EFAFB233-063F-42B5-8137-9DF3F51BA10A}">
+      <p15:sldGuideLst xmlns:p15="http://schemas.microsoft.com/office/powerpoint/2012/main"/>
+    </p:ext>
+  </p:extLst>
 </p:presentation>
 </file>
 
@@ -3351,7 +3360,7 @@
           <a:lstStyle/>
           <a:p>
             <a:r>
-              <a:rPr lang="en-US" sz="5400" dirty="0"/>
+              <a:rPr lang="en-US" sz="5400" b="1" dirty="0"/>
               <a:t>Multispectral Optoacoustic Tomography </a:t>
             </a:r>
           </a:p>
@@ -3380,11 +3389,13 @@
           </a:xfrm>
         </p:spPr>
         <p:txBody>
-          <a:bodyPr/>
-          <a:lstStyle/>
-          <a:p>
-            <a:r>
-              <a:rPr lang="en-US" dirty="0"/>
+          <a:bodyPr>
+            <a:noAutofit/>
+          </a:bodyPr>
+          <a:lstStyle/>
+          <a:p>
+            <a:r>
+              <a:rPr lang="en-US" sz="3600" dirty="0"/>
               <a:t>Kyle Jones</a:t>
             </a:r>
           </a:p>
@@ -3442,40 +3453,69 @@
           <a:lstStyle/>
           <a:p>
             <a:r>
+              <a:rPr lang="en-US" b="1" dirty="0"/>
+              <a:t>Background</a:t>
+            </a:r>
+          </a:p>
+        </p:txBody>
+      </p:sp>
+      <p:sp>
+        <p:nvSpPr>
+          <p:cNvPr id="3" name="Content Placeholder 2">
+            <a:extLst>
+              <a:ext uri="{FF2B5EF4-FFF2-40B4-BE49-F238E27FC236}">
+                <a16:creationId xmlns:a16="http://schemas.microsoft.com/office/drawing/2014/main" id="{7E7EA47C-BB5D-4E88-AB59-70CAA858D8B0}"/>
+              </a:ext>
+            </a:extLst>
+          </p:cNvPr>
+          <p:cNvSpPr>
+            <a:spLocks noGrp="1"/>
+          </p:cNvSpPr>
+          <p:nvPr>
+            <p:ph idx="1"/>
+          </p:nvPr>
+        </p:nvSpPr>
+        <p:spPr/>
+        <p:txBody>
+          <a:bodyPr/>
+          <a:lstStyle/>
+          <a:p>
+            <a:r>
+              <a:rPr lang="en-US" u="sng" dirty="0"/>
+              <a:t>Multispectral Optoacoustic Tomography (MSOT)</a:t>
+            </a:r>
+            <a:r>
               <a:rPr lang="en-US" dirty="0"/>
-              <a:t>Background</a:t>
-            </a:r>
-          </a:p>
-        </p:txBody>
-      </p:sp>
-      <p:sp>
-        <p:nvSpPr>
-          <p:cNvPr id="3" name="Content Placeholder 2">
-            <a:extLst>
-              <a:ext uri="{FF2B5EF4-FFF2-40B4-BE49-F238E27FC236}">
-                <a16:creationId xmlns:a16="http://schemas.microsoft.com/office/drawing/2014/main" id="{7E7EA47C-BB5D-4E88-AB59-70CAA858D8B0}"/>
-              </a:ext>
-            </a:extLst>
-          </p:cNvPr>
-          <p:cNvSpPr>
-            <a:spLocks noGrp="1"/>
-          </p:cNvSpPr>
-          <p:nvPr>
-            <p:ph idx="1"/>
-          </p:nvPr>
-        </p:nvSpPr>
-        <p:spPr/>
-        <p:txBody>
-          <a:bodyPr/>
-          <a:lstStyle/>
-          <a:p>
+              <a:t>: a non-invasive molecular imaging method that can be used to diagnose tumors and monitor treatment response.</a:t>
+            </a:r>
+          </a:p>
+          <a:p>
+            <a:pPr lvl="1">
+              <a:buFont typeface="Courier New" panose="02070309020205020404" pitchFamily="49" charset="0"/>
+              <a:buChar char="o"/>
+            </a:pPr>
             <a:r>
               <a:rPr lang="en-US" dirty="0"/>
-              <a:t>Multispectral Optoacoustic Tomography (MSOT) is a non-invasive method </a:t>
-            </a:r>
-            <a:r>
-              <a:rPr lang="en-US"/>
-              <a:t>of imaging </a:t>
+              <a:t>MSOT spectra contain information relevant to clinicians, such as tumor oxygenation and vascular perfusion</a:t>
+            </a:r>
+          </a:p>
+          <a:p>
+            <a:endParaRPr lang="en-US" dirty="0"/>
+          </a:p>
+          <a:p>
+            <a:r>
+              <a:rPr lang="en-US" dirty="0"/>
+              <a:t>MSOT spectra are currently evaluated using a spectral unmixing technique that works well under noise-free conditions, but poorly under noisy conditions.</a:t>
+            </a:r>
+          </a:p>
+          <a:p>
+            <a:pPr lvl="1">
+              <a:buFont typeface="Courier New" panose="02070309020205020404" pitchFamily="49" charset="0"/>
+              <a:buChar char="o"/>
+            </a:pPr>
+            <a:r>
+              <a:rPr lang="en-US" dirty="0"/>
+              <a:t>Machine learning algorithms may perform better under noisy conditions.</a:t>
             </a:r>
           </a:p>
         </p:txBody>
@@ -3484,6 +3524,2891 @@
     <p:extLst>
       <p:ext uri="{BB962C8B-B14F-4D97-AF65-F5344CB8AC3E}">
         <p14:creationId xmlns:p14="http://schemas.microsoft.com/office/powerpoint/2010/main" val="4105262995"/>
+      </p:ext>
+    </p:extLst>
+  </p:cSld>
+  <p:clrMapOvr>
+    <a:masterClrMapping/>
+  </p:clrMapOvr>
+</p:sld>
+</file>
+
+<file path=ppt/slides/slide3.xml><?xml version="1.0" encoding="utf-8"?>
+<p:sld xmlns:a="http://schemas.openxmlformats.org/drawingml/2006/main" xmlns:r="http://schemas.openxmlformats.org/officeDocument/2006/relationships" xmlns:p="http://schemas.openxmlformats.org/presentationml/2006/main">
+  <p:cSld>
+    <p:spTree>
+      <p:nvGrpSpPr>
+        <p:cNvPr id="1" name=""/>
+        <p:cNvGrpSpPr/>
+        <p:nvPr/>
+      </p:nvGrpSpPr>
+      <p:grpSpPr>
+        <a:xfrm>
+          <a:off x="0" y="0"/>
+          <a:ext cx="0" cy="0"/>
+          <a:chOff x="0" y="0"/>
+          <a:chExt cx="0" cy="0"/>
+        </a:xfrm>
+      </p:grpSpPr>
+      <p:sp>
+        <p:nvSpPr>
+          <p:cNvPr id="2" name="Title 1">
+            <a:extLst>
+              <a:ext uri="{FF2B5EF4-FFF2-40B4-BE49-F238E27FC236}">
+                <a16:creationId xmlns:a16="http://schemas.microsoft.com/office/drawing/2014/main" id="{EAB4C2F3-4F70-4283-9A80-4338A0A2701D}"/>
+              </a:ext>
+            </a:extLst>
+          </p:cNvPr>
+          <p:cNvSpPr>
+            <a:spLocks noGrp="1"/>
+          </p:cNvSpPr>
+          <p:nvPr>
+            <p:ph type="title"/>
+          </p:nvPr>
+        </p:nvSpPr>
+        <p:spPr/>
+        <p:txBody>
+          <a:bodyPr/>
+          <a:lstStyle/>
+          <a:p>
+            <a:r>
+              <a:rPr lang="en-US" b="1" dirty="0"/>
+              <a:t>Purpose</a:t>
+            </a:r>
+          </a:p>
+        </p:txBody>
+      </p:sp>
+      <p:sp>
+        <p:nvSpPr>
+          <p:cNvPr id="3" name="Content Placeholder 2">
+            <a:extLst>
+              <a:ext uri="{FF2B5EF4-FFF2-40B4-BE49-F238E27FC236}">
+                <a16:creationId xmlns:a16="http://schemas.microsoft.com/office/drawing/2014/main" id="{7E7EA47C-BB5D-4E88-AB59-70CAA858D8B0}"/>
+              </a:ext>
+            </a:extLst>
+          </p:cNvPr>
+          <p:cNvSpPr>
+            <a:spLocks noGrp="1"/>
+          </p:cNvSpPr>
+          <p:nvPr>
+            <p:ph idx="1"/>
+          </p:nvPr>
+        </p:nvSpPr>
+        <p:spPr>
+          <a:xfrm>
+            <a:off x="838200" y="1497107"/>
+            <a:ext cx="10515600" cy="4995768"/>
+          </a:xfrm>
+        </p:spPr>
+        <p:txBody>
+          <a:bodyPr>
+            <a:normAutofit lnSpcReduction="10000"/>
+          </a:bodyPr>
+          <a:lstStyle/>
+          <a:p>
+            <a:r>
+              <a:rPr lang="en-US" u="sng" dirty="0"/>
+              <a:t>Purpose 1</a:t>
+            </a:r>
+            <a:r>
+              <a:rPr lang="en-US" dirty="0"/>
+              <a:t>: compare the accuracy and precision of Hemoglobin (Hb), Oxygen (O2) and ICG fractional component measurements between the traditional spectral unmixing method and machine learning methods.</a:t>
+            </a:r>
+          </a:p>
+          <a:p>
+            <a:pPr lvl="1">
+              <a:buFont typeface="Courier New" panose="02070309020205020404" pitchFamily="49" charset="0"/>
+              <a:buChar char="o"/>
+            </a:pPr>
+            <a:r>
+              <a:rPr lang="en-US" dirty="0"/>
+              <a:t>Comparisons will be done under noise-free and noisy conditions.</a:t>
+            </a:r>
+          </a:p>
+          <a:p>
+            <a:endParaRPr lang="en-US" dirty="0"/>
+          </a:p>
+          <a:p>
+            <a:r>
+              <a:rPr lang="en-US" u="sng" dirty="0"/>
+              <a:t>Purpose 2</a:t>
+            </a:r>
+            <a:r>
+              <a:rPr lang="en-US" dirty="0"/>
+              <a:t>: determine the optimal frequency components when acquiring an MSOT spectrum</a:t>
+            </a:r>
+          </a:p>
+          <a:p>
+            <a:pPr lvl="1">
+              <a:buFont typeface="Courier New" panose="02070309020205020404" pitchFamily="49" charset="0"/>
+              <a:buChar char="o"/>
+            </a:pPr>
+            <a:r>
+              <a:rPr lang="en-US" dirty="0"/>
+              <a:t>Under in vivo conditions, it’s not realistic to acquire densely sampled spectra</a:t>
+            </a:r>
+          </a:p>
+          <a:p>
+            <a:pPr lvl="1">
+              <a:buFont typeface="Courier New" panose="02070309020205020404" pitchFamily="49" charset="0"/>
+              <a:buChar char="o"/>
+            </a:pPr>
+            <a:r>
+              <a:rPr lang="en-US" dirty="0"/>
+              <a:t>If we only have time to acquire 6 images (i.e., 6 frequencies), what frequencies will give the most accurate Hb, O2, and ICG measurements?</a:t>
+            </a:r>
+          </a:p>
+          <a:p>
+            <a:pPr lvl="1">
+              <a:buFont typeface="Courier New" panose="02070309020205020404" pitchFamily="49" charset="0"/>
+              <a:buChar char="o"/>
+            </a:pPr>
+            <a:r>
+              <a:rPr lang="en-US" dirty="0"/>
+              <a:t>Do machine learning methods work better than the traditional unmixing method when the MSOT spectrum is sparse?</a:t>
+            </a:r>
+          </a:p>
+        </p:txBody>
+      </p:sp>
+    </p:spTree>
+    <p:extLst>
+      <p:ext uri="{BB962C8B-B14F-4D97-AF65-F5344CB8AC3E}">
+        <p14:creationId xmlns:p14="http://schemas.microsoft.com/office/powerpoint/2010/main" val="3387029587"/>
+      </p:ext>
+    </p:extLst>
+  </p:cSld>
+  <p:clrMapOvr>
+    <a:masterClrMapping/>
+  </p:clrMapOvr>
+</p:sld>
+</file>
+
+<file path=ppt/slides/slide4.xml><?xml version="1.0" encoding="utf-8"?>
+<p:sld xmlns:a="http://schemas.openxmlformats.org/drawingml/2006/main" xmlns:r="http://schemas.openxmlformats.org/officeDocument/2006/relationships" xmlns:p="http://schemas.openxmlformats.org/presentationml/2006/main">
+  <p:cSld>
+    <p:spTree>
+      <p:nvGrpSpPr>
+        <p:cNvPr id="1" name=""/>
+        <p:cNvGrpSpPr/>
+        <p:nvPr/>
+      </p:nvGrpSpPr>
+      <p:grpSpPr>
+        <a:xfrm>
+          <a:off x="0" y="0"/>
+          <a:ext cx="0" cy="0"/>
+          <a:chOff x="0" y="0"/>
+          <a:chExt cx="0" cy="0"/>
+        </a:xfrm>
+      </p:grpSpPr>
+      <p:sp>
+        <p:nvSpPr>
+          <p:cNvPr id="2" name="Title 1">
+            <a:extLst>
+              <a:ext uri="{FF2B5EF4-FFF2-40B4-BE49-F238E27FC236}">
+                <a16:creationId xmlns:a16="http://schemas.microsoft.com/office/drawing/2014/main" id="{EAB4C2F3-4F70-4283-9A80-4338A0A2701D}"/>
+              </a:ext>
+            </a:extLst>
+          </p:cNvPr>
+          <p:cNvSpPr>
+            <a:spLocks noGrp="1"/>
+          </p:cNvSpPr>
+          <p:nvPr>
+            <p:ph type="title"/>
+          </p:nvPr>
+        </p:nvSpPr>
+        <p:spPr>
+          <a:xfrm>
+            <a:off x="2926977" y="2382183"/>
+            <a:ext cx="6485965" cy="1325563"/>
+          </a:xfrm>
+        </p:spPr>
+        <p:txBody>
+          <a:bodyPr/>
+          <a:lstStyle/>
+          <a:p>
+            <a:r>
+              <a:rPr lang="en-US" b="1" dirty="0"/>
+              <a:t>What has been done so far?</a:t>
+            </a:r>
+          </a:p>
+        </p:txBody>
+      </p:sp>
+    </p:spTree>
+    <p:extLst>
+      <p:ext uri="{BB962C8B-B14F-4D97-AF65-F5344CB8AC3E}">
+        <p14:creationId xmlns:p14="http://schemas.microsoft.com/office/powerpoint/2010/main" val="1344121547"/>
+      </p:ext>
+    </p:extLst>
+  </p:cSld>
+  <p:clrMapOvr>
+    <a:masterClrMapping/>
+  </p:clrMapOvr>
+</p:sld>
+</file>
+
+<file path=ppt/slides/slide5.xml><?xml version="1.0" encoding="utf-8"?>
+<p:sld xmlns:a="http://schemas.openxmlformats.org/drawingml/2006/main" xmlns:r="http://schemas.openxmlformats.org/officeDocument/2006/relationships" xmlns:p="http://schemas.openxmlformats.org/presentationml/2006/main">
+  <p:cSld>
+    <p:spTree>
+      <p:nvGrpSpPr>
+        <p:cNvPr id="1" name=""/>
+        <p:cNvGrpSpPr/>
+        <p:nvPr/>
+      </p:nvGrpSpPr>
+      <p:grpSpPr>
+        <a:xfrm>
+          <a:off x="0" y="0"/>
+          <a:ext cx="0" cy="0"/>
+          <a:chOff x="0" y="0"/>
+          <a:chExt cx="0" cy="0"/>
+        </a:xfrm>
+      </p:grpSpPr>
+      <p:sp>
+        <p:nvSpPr>
+          <p:cNvPr id="2" name="Title 1">
+            <a:extLst>
+              <a:ext uri="{FF2B5EF4-FFF2-40B4-BE49-F238E27FC236}">
+                <a16:creationId xmlns:a16="http://schemas.microsoft.com/office/drawing/2014/main" id="{EAB4C2F3-4F70-4283-9A80-4338A0A2701D}"/>
+              </a:ext>
+            </a:extLst>
+          </p:cNvPr>
+          <p:cNvSpPr>
+            <a:spLocks noGrp="1"/>
+          </p:cNvSpPr>
+          <p:nvPr>
+            <p:ph type="title"/>
+          </p:nvPr>
+        </p:nvSpPr>
+        <p:spPr>
+          <a:xfrm>
+            <a:off x="838200" y="69288"/>
+            <a:ext cx="10515600" cy="1325563"/>
+          </a:xfrm>
+        </p:spPr>
+        <p:txBody>
+          <a:bodyPr>
+            <a:normAutofit/>
+          </a:bodyPr>
+          <a:lstStyle/>
+          <a:p>
+            <a:r>
+              <a:rPr lang="en-US" sz="4000" b="1" dirty="0"/>
+              <a:t>Coded the traditional unmixing method in Python</a:t>
+            </a:r>
+          </a:p>
+        </p:txBody>
+      </p:sp>
+      <p:graphicFrame>
+        <p:nvGraphicFramePr>
+          <p:cNvPr id="6" name="Table 6">
+            <a:extLst>
+              <a:ext uri="{FF2B5EF4-FFF2-40B4-BE49-F238E27FC236}">
+                <a16:creationId xmlns:a16="http://schemas.microsoft.com/office/drawing/2014/main" id="{FB4E69D8-B061-4335-B65A-902631655F23}"/>
+              </a:ext>
+            </a:extLst>
+          </p:cNvPr>
+          <p:cNvGraphicFramePr>
+            <a:graphicFrameLocks noGrp="1"/>
+          </p:cNvGraphicFramePr>
+          <p:nvPr>
+            <p:extLst>
+              <p:ext uri="{D42A27DB-BD31-4B8C-83A1-F6EECF244321}">
+                <p14:modId xmlns:p14="http://schemas.microsoft.com/office/powerpoint/2010/main" val="2607105639"/>
+              </p:ext>
+            </p:extLst>
+          </p:nvPr>
+        </p:nvGraphicFramePr>
+        <p:xfrm>
+          <a:off x="147915" y="1308843"/>
+          <a:ext cx="11501721" cy="1752600"/>
+        </p:xfrm>
+        <a:graphic>
+          <a:graphicData uri="http://schemas.openxmlformats.org/drawingml/2006/table">
+            <a:tbl>
+              <a:tblPr firstRow="1" bandRow="1">
+                <a:tableStyleId>{5C22544A-7EE6-4342-B048-85BDC9FD1C3A}</a:tableStyleId>
+              </a:tblPr>
+              <a:tblGrid>
+                <a:gridCol w="2868709">
+                  <a:extLst>
+                    <a:ext uri="{9D8B030D-6E8A-4147-A177-3AD203B41FA5}">
+                      <a16:colId xmlns:a16="http://schemas.microsoft.com/office/drawing/2014/main" val="3058952261"/>
+                    </a:ext>
+                  </a:extLst>
+                </a:gridCol>
+                <a:gridCol w="2814918">
+                  <a:extLst>
+                    <a:ext uri="{9D8B030D-6E8A-4147-A177-3AD203B41FA5}">
+                      <a16:colId xmlns:a16="http://schemas.microsoft.com/office/drawing/2014/main" val="1233416698"/>
+                    </a:ext>
+                  </a:extLst>
+                </a:gridCol>
+                <a:gridCol w="2814917">
+                  <a:extLst>
+                    <a:ext uri="{9D8B030D-6E8A-4147-A177-3AD203B41FA5}">
+                      <a16:colId xmlns:a16="http://schemas.microsoft.com/office/drawing/2014/main" val="3002192346"/>
+                    </a:ext>
+                  </a:extLst>
+                </a:gridCol>
+                <a:gridCol w="3003177">
+                  <a:extLst>
+                    <a:ext uri="{9D8B030D-6E8A-4147-A177-3AD203B41FA5}">
+                      <a16:colId xmlns:a16="http://schemas.microsoft.com/office/drawing/2014/main" val="2150674968"/>
+                    </a:ext>
+                  </a:extLst>
+                </a:gridCol>
+              </a:tblGrid>
+              <a:tr h="370840">
+                <a:tc>
+                  <a:txBody>
+                    <a:bodyPr/>
+                    <a:lstStyle/>
+                    <a:p>
+                      <a:pPr algn="ctr"/>
+                      <a:r>
+                        <a:rPr lang="en-US" dirty="0"/>
+                        <a:t>Y </a:t>
+                      </a:r>
+                    </a:p>
+                    <a:p>
+                      <a:pPr algn="ctr"/>
+                      <a:r>
+                        <a:rPr lang="en-US" dirty="0"/>
+                        <a:t>(experimental MSOT signal)</a:t>
+                      </a:r>
+                    </a:p>
+                  </a:txBody>
+                  <a:tcPr/>
+                </a:tc>
+                <a:tc>
+                  <a:txBody>
+                    <a:bodyPr/>
+                    <a:lstStyle/>
+                    <a:p>
+                      <a:pPr algn="ctr"/>
+                      <a:r>
+                        <a:rPr lang="en-US" dirty="0"/>
+                        <a:t>Hb </a:t>
+                      </a:r>
+                    </a:p>
+                    <a:p>
+                      <a:pPr algn="ctr"/>
+                      <a:r>
+                        <a:rPr lang="en-US" dirty="0"/>
+                        <a:t>(known 100% Hb spectrum)</a:t>
+                      </a:r>
+                    </a:p>
+                  </a:txBody>
+                  <a:tcPr/>
+                </a:tc>
+                <a:tc>
+                  <a:txBody>
+                    <a:bodyPr/>
+                    <a:lstStyle/>
+                    <a:p>
+                      <a:pPr algn="ctr"/>
+                      <a:r>
+                        <a:rPr lang="en-US" dirty="0"/>
+                        <a:t>O2</a:t>
+                      </a:r>
+                    </a:p>
+                    <a:p>
+                      <a:pPr algn="ctr"/>
+                      <a:r>
+                        <a:rPr lang="en-US" dirty="0"/>
+                        <a:t>(known 100% O2 spectrum)</a:t>
+                      </a:r>
+                    </a:p>
+                  </a:txBody>
+                  <a:tcPr/>
+                </a:tc>
+                <a:tc>
+                  <a:txBody>
+                    <a:bodyPr/>
+                    <a:lstStyle/>
+                    <a:p>
+                      <a:pPr algn="ctr"/>
+                      <a:r>
+                        <a:rPr lang="en-US" dirty="0"/>
+                        <a:t>ICG</a:t>
+                      </a:r>
+                    </a:p>
+                    <a:p>
+                      <a:pPr algn="ctr"/>
+                      <a:r>
+                        <a:rPr lang="en-US" dirty="0"/>
+                        <a:t>(known 100% ICG spectrum)</a:t>
+                      </a:r>
+                    </a:p>
+                  </a:txBody>
+                  <a:tcPr/>
+                </a:tc>
+                <a:extLst>
+                  <a:ext uri="{0D108BD9-81ED-4DB2-BD59-A6C34878D82A}">
+                    <a16:rowId xmlns:a16="http://schemas.microsoft.com/office/drawing/2014/main" val="3591867232"/>
+                  </a:ext>
+                </a:extLst>
+              </a:tr>
+              <a:tr h="370840">
+                <a:tc>
+                  <a:txBody>
+                    <a:bodyPr/>
+                    <a:lstStyle/>
+                    <a:p>
+                      <a:pPr algn="ctr"/>
+                      <a:r>
+                        <a:rPr lang="en-US" dirty="0"/>
+                        <a:t>1</a:t>
+                      </a:r>
+                    </a:p>
+                  </a:txBody>
+                  <a:tcPr/>
+                </a:tc>
+                <a:tc>
+                  <a:txBody>
+                    <a:bodyPr/>
+                    <a:lstStyle/>
+                    <a:p>
+                      <a:pPr algn="ctr"/>
+                      <a:r>
+                        <a:rPr lang="en-US" dirty="0"/>
+                        <a:t>1</a:t>
+                      </a:r>
+                    </a:p>
+                  </a:txBody>
+                  <a:tcPr/>
+                </a:tc>
+                <a:tc>
+                  <a:txBody>
+                    <a:bodyPr/>
+                    <a:lstStyle/>
+                    <a:p>
+                      <a:pPr algn="ctr"/>
+                      <a:r>
+                        <a:rPr lang="en-US" dirty="0"/>
+                        <a:t>1</a:t>
+                      </a:r>
+                    </a:p>
+                  </a:txBody>
+                  <a:tcPr/>
+                </a:tc>
+                <a:tc>
+                  <a:txBody>
+                    <a:bodyPr/>
+                    <a:lstStyle/>
+                    <a:p>
+                      <a:pPr algn="ctr"/>
+                      <a:r>
+                        <a:rPr lang="en-US" dirty="0"/>
+                        <a:t>1</a:t>
+                      </a:r>
+                    </a:p>
+                  </a:txBody>
+                  <a:tcPr/>
+                </a:tc>
+                <a:extLst>
+                  <a:ext uri="{0D108BD9-81ED-4DB2-BD59-A6C34878D82A}">
+                    <a16:rowId xmlns:a16="http://schemas.microsoft.com/office/drawing/2014/main" val="4280959929"/>
+                  </a:ext>
+                </a:extLst>
+              </a:tr>
+              <a:tr h="370840">
+                <a:tc>
+                  <a:txBody>
+                    <a:bodyPr/>
+                    <a:lstStyle/>
+                    <a:p>
+                      <a:pPr algn="ctr"/>
+                      <a:r>
+                        <a:rPr lang="en-US" dirty="0"/>
+                        <a:t>0.8</a:t>
+                      </a:r>
+                    </a:p>
+                  </a:txBody>
+                  <a:tcPr/>
+                </a:tc>
+                <a:tc>
+                  <a:txBody>
+                    <a:bodyPr/>
+                    <a:lstStyle/>
+                    <a:p>
+                      <a:pPr algn="ctr"/>
+                      <a:r>
+                        <a:rPr lang="en-US" dirty="0"/>
+                        <a:t>0.9</a:t>
+                      </a:r>
+                    </a:p>
+                  </a:txBody>
+                  <a:tcPr/>
+                </a:tc>
+                <a:tc>
+                  <a:txBody>
+                    <a:bodyPr/>
+                    <a:lstStyle/>
+                    <a:p>
+                      <a:pPr algn="ctr"/>
+                      <a:r>
+                        <a:rPr lang="en-US" dirty="0"/>
+                        <a:t>0.7</a:t>
+                      </a:r>
+                    </a:p>
+                  </a:txBody>
+                  <a:tcPr/>
+                </a:tc>
+                <a:tc>
+                  <a:txBody>
+                    <a:bodyPr/>
+                    <a:lstStyle/>
+                    <a:p>
+                      <a:pPr algn="ctr"/>
+                      <a:r>
+                        <a:rPr lang="en-US" dirty="0"/>
+                        <a:t>0.5</a:t>
+                      </a:r>
+                    </a:p>
+                  </a:txBody>
+                  <a:tcPr/>
+                </a:tc>
+                <a:extLst>
+                  <a:ext uri="{0D108BD9-81ED-4DB2-BD59-A6C34878D82A}">
+                    <a16:rowId xmlns:a16="http://schemas.microsoft.com/office/drawing/2014/main" val="1624402395"/>
+                  </a:ext>
+                </a:extLst>
+              </a:tr>
+              <a:tr h="370840">
+                <a:tc>
+                  <a:txBody>
+                    <a:bodyPr/>
+                    <a:lstStyle/>
+                    <a:p>
+                      <a:pPr algn="ctr"/>
+                      <a:r>
+                        <a:rPr lang="en-US" dirty="0"/>
+                        <a:t>0.72</a:t>
+                      </a:r>
+                    </a:p>
+                  </a:txBody>
+                  <a:tcPr/>
+                </a:tc>
+                <a:tc>
+                  <a:txBody>
+                    <a:bodyPr/>
+                    <a:lstStyle/>
+                    <a:p>
+                      <a:pPr algn="ctr"/>
+                      <a:r>
+                        <a:rPr lang="en-US" dirty="0"/>
+                        <a:t>0.8</a:t>
+                      </a:r>
+                    </a:p>
+                  </a:txBody>
+                  <a:tcPr/>
+                </a:tc>
+                <a:tc>
+                  <a:txBody>
+                    <a:bodyPr/>
+                    <a:lstStyle/>
+                    <a:p>
+                      <a:pPr algn="ctr"/>
+                      <a:r>
+                        <a:rPr lang="en-US" dirty="0"/>
+                        <a:t>0.5</a:t>
+                      </a:r>
+                    </a:p>
+                  </a:txBody>
+                  <a:tcPr/>
+                </a:tc>
+                <a:tc>
+                  <a:txBody>
+                    <a:bodyPr/>
+                    <a:lstStyle/>
+                    <a:p>
+                      <a:pPr algn="ctr"/>
+                      <a:r>
+                        <a:rPr lang="en-US" dirty="0"/>
+                        <a:t>0.1</a:t>
+                      </a:r>
+                    </a:p>
+                  </a:txBody>
+                  <a:tcPr/>
+                </a:tc>
+                <a:extLst>
+                  <a:ext uri="{0D108BD9-81ED-4DB2-BD59-A6C34878D82A}">
+                    <a16:rowId xmlns:a16="http://schemas.microsoft.com/office/drawing/2014/main" val="1021223636"/>
+                  </a:ext>
+                </a:extLst>
+              </a:tr>
+            </a:tbl>
+          </a:graphicData>
+        </a:graphic>
+      </p:graphicFrame>
+      <p:sp>
+        <p:nvSpPr>
+          <p:cNvPr id="7" name="TextBox 6">
+            <a:extLst>
+              <a:ext uri="{FF2B5EF4-FFF2-40B4-BE49-F238E27FC236}">
+                <a16:creationId xmlns:a16="http://schemas.microsoft.com/office/drawing/2014/main" id="{2E2C6D67-0262-4EDC-B1EB-F9A578FEA7AF}"/>
+              </a:ext>
+            </a:extLst>
+          </p:cNvPr>
+          <p:cNvSpPr txBox="1"/>
+          <p:nvPr/>
+        </p:nvSpPr>
+        <p:spPr>
+          <a:xfrm>
+            <a:off x="147915" y="903305"/>
+            <a:ext cx="1213224" cy="461665"/>
+          </a:xfrm>
+          <a:prstGeom prst="rect">
+            <a:avLst/>
+          </a:prstGeom>
+          <a:noFill/>
+        </p:spPr>
+        <p:txBody>
+          <a:bodyPr wrap="square" rtlCol="0">
+            <a:spAutoFit/>
+          </a:bodyPr>
+          <a:lstStyle/>
+          <a:p>
+            <a:r>
+              <a:rPr lang="en-US" sz="2400" b="1" dirty="0"/>
+              <a:t>Dataset</a:t>
+            </a:r>
+          </a:p>
+        </p:txBody>
+      </p:sp>
+      <p:graphicFrame>
+        <p:nvGraphicFramePr>
+          <p:cNvPr id="8" name="Table 6">
+            <a:extLst>
+              <a:ext uri="{FF2B5EF4-FFF2-40B4-BE49-F238E27FC236}">
+                <a16:creationId xmlns:a16="http://schemas.microsoft.com/office/drawing/2014/main" id="{AEB1DAB4-1CF7-4828-9231-889AD37A1D32}"/>
+              </a:ext>
+            </a:extLst>
+          </p:cNvPr>
+          <p:cNvGraphicFramePr>
+            <a:graphicFrameLocks noGrp="1"/>
+          </p:cNvGraphicFramePr>
+          <p:nvPr>
+            <p:extLst>
+              <p:ext uri="{D42A27DB-BD31-4B8C-83A1-F6EECF244321}">
+                <p14:modId xmlns:p14="http://schemas.microsoft.com/office/powerpoint/2010/main" val="3095502129"/>
+              </p:ext>
+            </p:extLst>
+          </p:nvPr>
+        </p:nvGraphicFramePr>
+        <p:xfrm>
+          <a:off x="147915" y="3466981"/>
+          <a:ext cx="11501720" cy="369909"/>
+        </p:xfrm>
+        <a:graphic>
+          <a:graphicData uri="http://schemas.openxmlformats.org/drawingml/2006/table">
+            <a:tbl>
+              <a:tblPr firstRow="1" bandRow="1">
+                <a:tableStyleId>{5C22544A-7EE6-4342-B048-85BDC9FD1C3A}</a:tableStyleId>
+              </a:tblPr>
+              <a:tblGrid>
+                <a:gridCol w="2875430">
+                  <a:extLst>
+                    <a:ext uri="{9D8B030D-6E8A-4147-A177-3AD203B41FA5}">
+                      <a16:colId xmlns:a16="http://schemas.microsoft.com/office/drawing/2014/main" val="3058952261"/>
+                    </a:ext>
+                  </a:extLst>
+                </a:gridCol>
+                <a:gridCol w="2794750">
+                  <a:extLst>
+                    <a:ext uri="{9D8B030D-6E8A-4147-A177-3AD203B41FA5}">
+                      <a16:colId xmlns:a16="http://schemas.microsoft.com/office/drawing/2014/main" val="1233416698"/>
+                    </a:ext>
+                  </a:extLst>
+                </a:gridCol>
+                <a:gridCol w="2850776">
+                  <a:extLst>
+                    <a:ext uri="{9D8B030D-6E8A-4147-A177-3AD203B41FA5}">
+                      <a16:colId xmlns:a16="http://schemas.microsoft.com/office/drawing/2014/main" val="3002192346"/>
+                    </a:ext>
+                  </a:extLst>
+                </a:gridCol>
+                <a:gridCol w="2980764">
+                  <a:extLst>
+                    <a:ext uri="{9D8B030D-6E8A-4147-A177-3AD203B41FA5}">
+                      <a16:colId xmlns:a16="http://schemas.microsoft.com/office/drawing/2014/main" val="2150674968"/>
+                    </a:ext>
+                  </a:extLst>
+                </a:gridCol>
+              </a:tblGrid>
+              <a:tr h="369909">
+                <a:tc>
+                  <a:txBody>
+                    <a:bodyPr/>
+                    <a:lstStyle/>
+                    <a:p>
+                      <a:pPr algn="ctr"/>
+                      <a:r>
+                        <a:rPr lang="en-US" b="0" dirty="0">
+                          <a:solidFill>
+                            <a:schemeClr val="tx1"/>
+                          </a:solidFill>
+                        </a:rPr>
+                        <a:t>1</a:t>
+                      </a:r>
+                    </a:p>
+                  </a:txBody>
+                  <a:tcPr>
+                    <a:solidFill>
+                      <a:schemeClr val="accent1">
+                        <a:lumMod val="20000"/>
+                        <a:lumOff val="80000"/>
+                      </a:schemeClr>
+                    </a:solidFill>
+                  </a:tcPr>
+                </a:tc>
+                <a:tc>
+                  <a:txBody>
+                    <a:bodyPr/>
+                    <a:lstStyle/>
+                    <a:p>
+                      <a:pPr algn="ctr"/>
+                      <a:r>
+                        <a:rPr lang="en-US" b="0" dirty="0">
+                          <a:solidFill>
+                            <a:schemeClr val="tx1"/>
+                          </a:solidFill>
+                        </a:rPr>
+                        <a:t>1</a:t>
+                      </a:r>
+                    </a:p>
+                  </a:txBody>
+                  <a:tcPr>
+                    <a:solidFill>
+                      <a:schemeClr val="accent1">
+                        <a:lumMod val="20000"/>
+                        <a:lumOff val="80000"/>
+                      </a:schemeClr>
+                    </a:solidFill>
+                  </a:tcPr>
+                </a:tc>
+                <a:tc>
+                  <a:txBody>
+                    <a:bodyPr/>
+                    <a:lstStyle/>
+                    <a:p>
+                      <a:pPr algn="ctr"/>
+                      <a:r>
+                        <a:rPr lang="en-US" b="0" dirty="0">
+                          <a:solidFill>
+                            <a:schemeClr val="tx1"/>
+                          </a:solidFill>
+                        </a:rPr>
+                        <a:t>1</a:t>
+                      </a:r>
+                    </a:p>
+                  </a:txBody>
+                  <a:tcPr>
+                    <a:solidFill>
+                      <a:schemeClr val="accent1">
+                        <a:lumMod val="20000"/>
+                        <a:lumOff val="80000"/>
+                      </a:schemeClr>
+                    </a:solidFill>
+                  </a:tcPr>
+                </a:tc>
+                <a:tc>
+                  <a:txBody>
+                    <a:bodyPr/>
+                    <a:lstStyle/>
+                    <a:p>
+                      <a:pPr algn="ctr"/>
+                      <a:r>
+                        <a:rPr lang="en-US" b="0" dirty="0">
+                          <a:solidFill>
+                            <a:schemeClr val="tx1"/>
+                          </a:solidFill>
+                        </a:rPr>
+                        <a:t>1</a:t>
+                      </a:r>
+                    </a:p>
+                  </a:txBody>
+                  <a:tcPr>
+                    <a:solidFill>
+                      <a:schemeClr val="accent1">
+                        <a:lumMod val="20000"/>
+                        <a:lumOff val="80000"/>
+                      </a:schemeClr>
+                    </a:solidFill>
+                  </a:tcPr>
+                </a:tc>
+                <a:extLst>
+                  <a:ext uri="{0D108BD9-81ED-4DB2-BD59-A6C34878D82A}">
+                    <a16:rowId xmlns:a16="http://schemas.microsoft.com/office/drawing/2014/main" val="1021223636"/>
+                  </a:ext>
+                </a:extLst>
+              </a:tr>
+            </a:tbl>
+          </a:graphicData>
+        </a:graphic>
+      </p:graphicFrame>
+      <p:sp>
+        <p:nvSpPr>
+          <p:cNvPr id="9" name="TextBox 8">
+            <a:extLst>
+              <a:ext uri="{FF2B5EF4-FFF2-40B4-BE49-F238E27FC236}">
+                <a16:creationId xmlns:a16="http://schemas.microsoft.com/office/drawing/2014/main" id="{790DEB60-427D-4BF5-BE4E-0E264C1C7B0F}"/>
+              </a:ext>
+            </a:extLst>
+          </p:cNvPr>
+          <p:cNvSpPr txBox="1"/>
+          <p:nvPr/>
+        </p:nvSpPr>
+        <p:spPr>
+          <a:xfrm>
+            <a:off x="5661210" y="2943761"/>
+            <a:ext cx="475129" cy="523220"/>
+          </a:xfrm>
+          <a:prstGeom prst="rect">
+            <a:avLst/>
+          </a:prstGeom>
+          <a:noFill/>
+        </p:spPr>
+        <p:txBody>
+          <a:bodyPr wrap="square" rtlCol="0">
+            <a:spAutoFit/>
+          </a:bodyPr>
+          <a:lstStyle/>
+          <a:p>
+            <a:r>
+              <a:rPr lang="en-US" sz="2800" dirty="0"/>
+              <a:t>…</a:t>
+            </a:r>
+          </a:p>
+        </p:txBody>
+      </p:sp>
+      <p:sp>
+        <p:nvSpPr>
+          <p:cNvPr id="10" name="TextBox 9">
+            <a:extLst>
+              <a:ext uri="{FF2B5EF4-FFF2-40B4-BE49-F238E27FC236}">
+                <a16:creationId xmlns:a16="http://schemas.microsoft.com/office/drawing/2014/main" id="{FC73B3FD-0F20-4DA5-BCDE-83CACCCB9079}"/>
+              </a:ext>
+            </a:extLst>
+          </p:cNvPr>
+          <p:cNvSpPr txBox="1"/>
+          <p:nvPr/>
+        </p:nvSpPr>
+        <p:spPr>
+          <a:xfrm>
+            <a:off x="11672046" y="3562285"/>
+            <a:ext cx="381004" cy="461665"/>
+          </a:xfrm>
+          <a:prstGeom prst="rect">
+            <a:avLst/>
+          </a:prstGeom>
+          <a:noFill/>
+        </p:spPr>
+        <p:txBody>
+          <a:bodyPr wrap="square" rtlCol="0">
+            <a:spAutoFit/>
+          </a:bodyPr>
+          <a:lstStyle/>
+          <a:p>
+            <a:r>
+              <a:rPr lang="en-US" sz="2400" dirty="0"/>
+              <a:t>n</a:t>
+            </a:r>
+          </a:p>
+        </p:txBody>
+      </p:sp>
+      <p:cxnSp>
+        <p:nvCxnSpPr>
+          <p:cNvPr id="12" name="Straight Arrow Connector 11">
+            <a:extLst>
+              <a:ext uri="{FF2B5EF4-FFF2-40B4-BE49-F238E27FC236}">
+                <a16:creationId xmlns:a16="http://schemas.microsoft.com/office/drawing/2014/main" id="{765138B0-8F62-4160-A164-A800C001171E}"/>
+              </a:ext>
+            </a:extLst>
+          </p:cNvPr>
+          <p:cNvCxnSpPr>
+            <a:cxnSpLocks/>
+          </p:cNvCxnSpPr>
+          <p:nvPr/>
+        </p:nvCxnSpPr>
+        <p:spPr>
+          <a:xfrm>
+            <a:off x="1595718" y="3899644"/>
+            <a:ext cx="0" cy="358588"/>
+          </a:xfrm>
+          <a:prstGeom prst="straightConnector1">
+            <a:avLst/>
+          </a:prstGeom>
+          <a:ln>
+            <a:tailEnd type="triangle"/>
+          </a:ln>
+        </p:spPr>
+        <p:style>
+          <a:lnRef idx="1">
+            <a:schemeClr val="dk1"/>
+          </a:lnRef>
+          <a:fillRef idx="0">
+            <a:schemeClr val="dk1"/>
+          </a:fillRef>
+          <a:effectRef idx="0">
+            <a:schemeClr val="dk1"/>
+          </a:effectRef>
+          <a:fontRef idx="minor">
+            <a:schemeClr val="tx1"/>
+          </a:fontRef>
+        </p:style>
+      </p:cxnSp>
+      <p:sp>
+        <p:nvSpPr>
+          <p:cNvPr id="15" name="TextBox 14">
+            <a:extLst>
+              <a:ext uri="{FF2B5EF4-FFF2-40B4-BE49-F238E27FC236}">
+                <a16:creationId xmlns:a16="http://schemas.microsoft.com/office/drawing/2014/main" id="{059C6A78-0BE0-46AA-B820-8FE4B2762FFF}"/>
+              </a:ext>
+            </a:extLst>
+          </p:cNvPr>
+          <p:cNvSpPr txBox="1"/>
+          <p:nvPr/>
+        </p:nvSpPr>
+        <p:spPr>
+          <a:xfrm>
+            <a:off x="564779" y="4320986"/>
+            <a:ext cx="2061882" cy="584775"/>
+          </a:xfrm>
+          <a:prstGeom prst="rect">
+            <a:avLst/>
+          </a:prstGeom>
+          <a:noFill/>
+        </p:spPr>
+        <p:txBody>
+          <a:bodyPr wrap="square" rtlCol="0">
+            <a:spAutoFit/>
+          </a:bodyPr>
+          <a:lstStyle/>
+          <a:p>
+            <a:pPr algn="ctr"/>
+            <a:r>
+              <a:rPr lang="en-US" sz="1600" dirty="0"/>
+              <a:t>experimental MSOT signal at n frequencies</a:t>
+            </a:r>
+          </a:p>
+        </p:txBody>
+      </p:sp>
+      <p:cxnSp>
+        <p:nvCxnSpPr>
+          <p:cNvPr id="16" name="Straight Arrow Connector 15">
+            <a:extLst>
+              <a:ext uri="{FF2B5EF4-FFF2-40B4-BE49-F238E27FC236}">
+                <a16:creationId xmlns:a16="http://schemas.microsoft.com/office/drawing/2014/main" id="{56B5D1EC-B9C2-4350-A0BD-3E94807F3A06}"/>
+              </a:ext>
+            </a:extLst>
+          </p:cNvPr>
+          <p:cNvCxnSpPr>
+            <a:cxnSpLocks/>
+          </p:cNvCxnSpPr>
+          <p:nvPr/>
+        </p:nvCxnSpPr>
+        <p:spPr>
+          <a:xfrm>
+            <a:off x="4437529" y="3899644"/>
+            <a:ext cx="0" cy="358588"/>
+          </a:xfrm>
+          <a:prstGeom prst="straightConnector1">
+            <a:avLst/>
+          </a:prstGeom>
+          <a:ln>
+            <a:tailEnd type="triangle"/>
+          </a:ln>
+        </p:spPr>
+        <p:style>
+          <a:lnRef idx="1">
+            <a:schemeClr val="dk1"/>
+          </a:lnRef>
+          <a:fillRef idx="0">
+            <a:schemeClr val="dk1"/>
+          </a:fillRef>
+          <a:effectRef idx="0">
+            <a:schemeClr val="dk1"/>
+          </a:effectRef>
+          <a:fontRef idx="minor">
+            <a:schemeClr val="tx1"/>
+          </a:fontRef>
+        </p:style>
+      </p:cxnSp>
+      <p:cxnSp>
+        <p:nvCxnSpPr>
+          <p:cNvPr id="17" name="Straight Arrow Connector 16">
+            <a:extLst>
+              <a:ext uri="{FF2B5EF4-FFF2-40B4-BE49-F238E27FC236}">
+                <a16:creationId xmlns:a16="http://schemas.microsoft.com/office/drawing/2014/main" id="{60FAC565-632D-4E90-82F1-B2D934C5458D}"/>
+              </a:ext>
+            </a:extLst>
+          </p:cNvPr>
+          <p:cNvCxnSpPr>
+            <a:cxnSpLocks/>
+          </p:cNvCxnSpPr>
+          <p:nvPr/>
+        </p:nvCxnSpPr>
+        <p:spPr>
+          <a:xfrm>
+            <a:off x="7234518" y="3898444"/>
+            <a:ext cx="0" cy="358588"/>
+          </a:xfrm>
+          <a:prstGeom prst="straightConnector1">
+            <a:avLst/>
+          </a:prstGeom>
+          <a:ln>
+            <a:tailEnd type="triangle"/>
+          </a:ln>
+        </p:spPr>
+        <p:style>
+          <a:lnRef idx="1">
+            <a:schemeClr val="dk1"/>
+          </a:lnRef>
+          <a:fillRef idx="0">
+            <a:schemeClr val="dk1"/>
+          </a:fillRef>
+          <a:effectRef idx="0">
+            <a:schemeClr val="dk1"/>
+          </a:effectRef>
+          <a:fontRef idx="minor">
+            <a:schemeClr val="tx1"/>
+          </a:fontRef>
+        </p:style>
+      </p:cxnSp>
+      <p:cxnSp>
+        <p:nvCxnSpPr>
+          <p:cNvPr id="18" name="Straight Arrow Connector 17">
+            <a:extLst>
+              <a:ext uri="{FF2B5EF4-FFF2-40B4-BE49-F238E27FC236}">
+                <a16:creationId xmlns:a16="http://schemas.microsoft.com/office/drawing/2014/main" id="{A50EA231-2414-42C8-A02E-D5C74ED66189}"/>
+              </a:ext>
+            </a:extLst>
+          </p:cNvPr>
+          <p:cNvCxnSpPr>
+            <a:cxnSpLocks/>
+          </p:cNvCxnSpPr>
+          <p:nvPr/>
+        </p:nvCxnSpPr>
+        <p:spPr>
+          <a:xfrm>
+            <a:off x="10165976" y="3898444"/>
+            <a:ext cx="0" cy="358588"/>
+          </a:xfrm>
+          <a:prstGeom prst="straightConnector1">
+            <a:avLst/>
+          </a:prstGeom>
+          <a:ln>
+            <a:tailEnd type="triangle"/>
+          </a:ln>
+        </p:spPr>
+        <p:style>
+          <a:lnRef idx="1">
+            <a:schemeClr val="dk1"/>
+          </a:lnRef>
+          <a:fillRef idx="0">
+            <a:schemeClr val="dk1"/>
+          </a:fillRef>
+          <a:effectRef idx="0">
+            <a:schemeClr val="dk1"/>
+          </a:effectRef>
+          <a:fontRef idx="minor">
+            <a:schemeClr val="tx1"/>
+          </a:fontRef>
+        </p:style>
+      </p:cxnSp>
+      <p:sp>
+        <p:nvSpPr>
+          <p:cNvPr id="19" name="TextBox 18">
+            <a:extLst>
+              <a:ext uri="{FF2B5EF4-FFF2-40B4-BE49-F238E27FC236}">
+                <a16:creationId xmlns:a16="http://schemas.microsoft.com/office/drawing/2014/main" id="{BE07454D-9F19-4C5C-B19F-191A94720D3C}"/>
+              </a:ext>
+            </a:extLst>
+          </p:cNvPr>
+          <p:cNvSpPr txBox="1"/>
+          <p:nvPr/>
+        </p:nvSpPr>
+        <p:spPr>
+          <a:xfrm>
+            <a:off x="3379693" y="4320986"/>
+            <a:ext cx="2133600" cy="584775"/>
+          </a:xfrm>
+          <a:prstGeom prst="rect">
+            <a:avLst/>
+          </a:prstGeom>
+          <a:noFill/>
+        </p:spPr>
+        <p:txBody>
+          <a:bodyPr wrap="square" rtlCol="0">
+            <a:spAutoFit/>
+          </a:bodyPr>
+          <a:lstStyle/>
+          <a:p>
+            <a:pPr algn="ctr"/>
+            <a:r>
+              <a:rPr lang="en-US" sz="1600" dirty="0"/>
+              <a:t>known 100% Hb MSOT signal at n frequencies</a:t>
+            </a:r>
+          </a:p>
+        </p:txBody>
+      </p:sp>
+      <p:sp>
+        <p:nvSpPr>
+          <p:cNvPr id="20" name="TextBox 19">
+            <a:extLst>
+              <a:ext uri="{FF2B5EF4-FFF2-40B4-BE49-F238E27FC236}">
+                <a16:creationId xmlns:a16="http://schemas.microsoft.com/office/drawing/2014/main" id="{1B85B97E-A0CF-4727-BB17-573E4337B652}"/>
+              </a:ext>
+            </a:extLst>
+          </p:cNvPr>
+          <p:cNvSpPr txBox="1"/>
+          <p:nvPr/>
+        </p:nvSpPr>
+        <p:spPr>
+          <a:xfrm>
+            <a:off x="6185641" y="4318586"/>
+            <a:ext cx="2133599" cy="584775"/>
+          </a:xfrm>
+          <a:prstGeom prst="rect">
+            <a:avLst/>
+          </a:prstGeom>
+          <a:noFill/>
+        </p:spPr>
+        <p:txBody>
+          <a:bodyPr wrap="square" rtlCol="0">
+            <a:spAutoFit/>
+          </a:bodyPr>
+          <a:lstStyle/>
+          <a:p>
+            <a:pPr algn="ctr"/>
+            <a:r>
+              <a:rPr lang="en-US" sz="1600" dirty="0"/>
+              <a:t>known 100% O2 MSOT signal at n frequencies</a:t>
+            </a:r>
+          </a:p>
+        </p:txBody>
+      </p:sp>
+      <p:sp>
+        <p:nvSpPr>
+          <p:cNvPr id="21" name="TextBox 20">
+            <a:extLst>
+              <a:ext uri="{FF2B5EF4-FFF2-40B4-BE49-F238E27FC236}">
+                <a16:creationId xmlns:a16="http://schemas.microsoft.com/office/drawing/2014/main" id="{73AD9F73-BBCF-4C7C-BA3C-BFFA099A19DA}"/>
+              </a:ext>
+            </a:extLst>
+          </p:cNvPr>
+          <p:cNvSpPr txBox="1"/>
+          <p:nvPr/>
+        </p:nvSpPr>
+        <p:spPr>
+          <a:xfrm>
+            <a:off x="9072273" y="4318586"/>
+            <a:ext cx="2133599" cy="584775"/>
+          </a:xfrm>
+          <a:prstGeom prst="rect">
+            <a:avLst/>
+          </a:prstGeom>
+          <a:noFill/>
+        </p:spPr>
+        <p:txBody>
+          <a:bodyPr wrap="square" rtlCol="0">
+            <a:spAutoFit/>
+          </a:bodyPr>
+          <a:lstStyle/>
+          <a:p>
+            <a:pPr algn="ctr"/>
+            <a:r>
+              <a:rPr lang="en-US" sz="1600" dirty="0"/>
+              <a:t>known 100% ICG MSOT signal at n frequencies</a:t>
+            </a:r>
+          </a:p>
+        </p:txBody>
+      </p:sp>
+      <p:sp>
+        <p:nvSpPr>
+          <p:cNvPr id="22" name="TextBox 21">
+            <a:extLst>
+              <a:ext uri="{FF2B5EF4-FFF2-40B4-BE49-F238E27FC236}">
+                <a16:creationId xmlns:a16="http://schemas.microsoft.com/office/drawing/2014/main" id="{69662BD6-701A-4B39-8801-3C51D7240827}"/>
+              </a:ext>
+            </a:extLst>
+          </p:cNvPr>
+          <p:cNvSpPr txBox="1"/>
+          <p:nvPr/>
+        </p:nvSpPr>
+        <p:spPr>
+          <a:xfrm>
+            <a:off x="394447" y="5127812"/>
+            <a:ext cx="3729317" cy="461665"/>
+          </a:xfrm>
+          <a:prstGeom prst="rect">
+            <a:avLst/>
+          </a:prstGeom>
+          <a:noFill/>
+        </p:spPr>
+        <p:txBody>
+          <a:bodyPr wrap="square" rtlCol="0">
+            <a:spAutoFit/>
+          </a:bodyPr>
+          <a:lstStyle/>
+          <a:p>
+            <a:r>
+              <a:rPr lang="en-US" sz="2400" b="1" u="sng" dirty="0"/>
+              <a:t>Spectral Unmixing Method</a:t>
+            </a:r>
+          </a:p>
+        </p:txBody>
+      </p:sp>
+      <p:sp>
+        <p:nvSpPr>
+          <p:cNvPr id="23" name="TextBox 22">
+            <a:extLst>
+              <a:ext uri="{FF2B5EF4-FFF2-40B4-BE49-F238E27FC236}">
+                <a16:creationId xmlns:a16="http://schemas.microsoft.com/office/drawing/2014/main" id="{D172AE41-58EF-4EFA-8C49-BDADBEE3D98B}"/>
+              </a:ext>
+            </a:extLst>
+          </p:cNvPr>
+          <p:cNvSpPr txBox="1"/>
+          <p:nvPr/>
+        </p:nvSpPr>
+        <p:spPr>
+          <a:xfrm>
+            <a:off x="430308" y="5506426"/>
+            <a:ext cx="4814046" cy="523220"/>
+          </a:xfrm>
+          <a:prstGeom prst="rect">
+            <a:avLst/>
+          </a:prstGeom>
+          <a:noFill/>
+        </p:spPr>
+        <p:txBody>
+          <a:bodyPr wrap="square" rtlCol="0">
+            <a:spAutoFit/>
+          </a:bodyPr>
+          <a:lstStyle/>
+          <a:p>
+            <a:r>
+              <a:rPr lang="en-US" sz="2800" dirty="0"/>
+              <a:t>Y = B1 x Hb + B2 x O2 + B3 x ICG</a:t>
+            </a:r>
+          </a:p>
+        </p:txBody>
+      </p:sp>
+      <p:cxnSp>
+        <p:nvCxnSpPr>
+          <p:cNvPr id="24" name="Straight Arrow Connector 23">
+            <a:extLst>
+              <a:ext uri="{FF2B5EF4-FFF2-40B4-BE49-F238E27FC236}">
+                <a16:creationId xmlns:a16="http://schemas.microsoft.com/office/drawing/2014/main" id="{0125F408-5271-4BD4-B983-4559242F6BE9}"/>
+              </a:ext>
+            </a:extLst>
+          </p:cNvPr>
+          <p:cNvCxnSpPr>
+            <a:cxnSpLocks/>
+          </p:cNvCxnSpPr>
+          <p:nvPr/>
+        </p:nvCxnSpPr>
+        <p:spPr>
+          <a:xfrm>
+            <a:off x="1228165" y="6029646"/>
+            <a:ext cx="0" cy="358588"/>
+          </a:xfrm>
+          <a:prstGeom prst="straightConnector1">
+            <a:avLst/>
+          </a:prstGeom>
+          <a:ln>
+            <a:tailEnd type="triangle"/>
+          </a:ln>
+        </p:spPr>
+        <p:style>
+          <a:lnRef idx="1">
+            <a:schemeClr val="dk1"/>
+          </a:lnRef>
+          <a:fillRef idx="0">
+            <a:schemeClr val="dk1"/>
+          </a:fillRef>
+          <a:effectRef idx="0">
+            <a:schemeClr val="dk1"/>
+          </a:effectRef>
+          <a:fontRef idx="minor">
+            <a:schemeClr val="tx1"/>
+          </a:fontRef>
+        </p:style>
+      </p:cxnSp>
+      <p:sp>
+        <p:nvSpPr>
+          <p:cNvPr id="25" name="Rectangle 24">
+            <a:extLst>
+              <a:ext uri="{FF2B5EF4-FFF2-40B4-BE49-F238E27FC236}">
+                <a16:creationId xmlns:a16="http://schemas.microsoft.com/office/drawing/2014/main" id="{AA15E93C-CF7A-4D73-B9C1-1782C07D7B71}"/>
+              </a:ext>
+            </a:extLst>
+          </p:cNvPr>
+          <p:cNvSpPr/>
+          <p:nvPr/>
+        </p:nvSpPr>
+        <p:spPr>
+          <a:xfrm>
+            <a:off x="959224" y="5544526"/>
+            <a:ext cx="510988" cy="448269"/>
+          </a:xfrm>
+          <a:prstGeom prst="rect">
+            <a:avLst/>
+          </a:prstGeom>
+          <a:noFill/>
+          <a:ln w="25400">
+            <a:solidFill>
+              <a:srgbClr val="92D050"/>
+            </a:solidFill>
+          </a:ln>
+        </p:spPr>
+        <p:style>
+          <a:lnRef idx="2">
+            <a:schemeClr val="accent1">
+              <a:shade val="50000"/>
+            </a:schemeClr>
+          </a:lnRef>
+          <a:fillRef idx="1">
+            <a:schemeClr val="accent1"/>
+          </a:fillRef>
+          <a:effectRef idx="0">
+            <a:schemeClr val="accent1"/>
+          </a:effectRef>
+          <a:fontRef idx="minor">
+            <a:schemeClr val="lt1"/>
+          </a:fontRef>
+        </p:style>
+        <p:txBody>
+          <a:bodyPr rtlCol="0" anchor="ctr"/>
+          <a:lstStyle/>
+          <a:p>
+            <a:pPr algn="ctr"/>
+            <a:endParaRPr lang="en-US"/>
+          </a:p>
+        </p:txBody>
+      </p:sp>
+      <p:sp>
+        <p:nvSpPr>
+          <p:cNvPr id="26" name="Rectangle 25">
+            <a:extLst>
+              <a:ext uri="{FF2B5EF4-FFF2-40B4-BE49-F238E27FC236}">
+                <a16:creationId xmlns:a16="http://schemas.microsoft.com/office/drawing/2014/main" id="{F7E887DE-3DA4-4A82-AD28-4D49FC9E891B}"/>
+              </a:ext>
+            </a:extLst>
+          </p:cNvPr>
+          <p:cNvSpPr/>
+          <p:nvPr/>
+        </p:nvSpPr>
+        <p:spPr>
+          <a:xfrm>
+            <a:off x="2390217" y="5544526"/>
+            <a:ext cx="510988" cy="448269"/>
+          </a:xfrm>
+          <a:prstGeom prst="rect">
+            <a:avLst/>
+          </a:prstGeom>
+          <a:noFill/>
+          <a:ln w="25400">
+            <a:solidFill>
+              <a:srgbClr val="92D050"/>
+            </a:solidFill>
+          </a:ln>
+        </p:spPr>
+        <p:style>
+          <a:lnRef idx="2">
+            <a:schemeClr val="accent1">
+              <a:shade val="50000"/>
+            </a:schemeClr>
+          </a:lnRef>
+          <a:fillRef idx="1">
+            <a:schemeClr val="accent1"/>
+          </a:fillRef>
+          <a:effectRef idx="0">
+            <a:schemeClr val="accent1"/>
+          </a:effectRef>
+          <a:fontRef idx="minor">
+            <a:schemeClr val="lt1"/>
+          </a:fontRef>
+        </p:style>
+        <p:txBody>
+          <a:bodyPr rtlCol="0" anchor="ctr"/>
+          <a:lstStyle/>
+          <a:p>
+            <a:pPr algn="ctr"/>
+            <a:endParaRPr lang="en-US"/>
+          </a:p>
+        </p:txBody>
+      </p:sp>
+      <p:sp>
+        <p:nvSpPr>
+          <p:cNvPr id="27" name="Rectangle 26">
+            <a:extLst>
+              <a:ext uri="{FF2B5EF4-FFF2-40B4-BE49-F238E27FC236}">
+                <a16:creationId xmlns:a16="http://schemas.microsoft.com/office/drawing/2014/main" id="{E8D4E041-D85B-408D-922E-1D2719634EB1}"/>
+              </a:ext>
+            </a:extLst>
+          </p:cNvPr>
+          <p:cNvSpPr/>
+          <p:nvPr/>
+        </p:nvSpPr>
+        <p:spPr>
+          <a:xfrm>
+            <a:off x="3839696" y="5544526"/>
+            <a:ext cx="510988" cy="448269"/>
+          </a:xfrm>
+          <a:prstGeom prst="rect">
+            <a:avLst/>
+          </a:prstGeom>
+          <a:noFill/>
+          <a:ln w="25400">
+            <a:solidFill>
+              <a:srgbClr val="92D050"/>
+            </a:solidFill>
+          </a:ln>
+        </p:spPr>
+        <p:style>
+          <a:lnRef idx="2">
+            <a:schemeClr val="accent1">
+              <a:shade val="50000"/>
+            </a:schemeClr>
+          </a:lnRef>
+          <a:fillRef idx="1">
+            <a:schemeClr val="accent1"/>
+          </a:fillRef>
+          <a:effectRef idx="0">
+            <a:schemeClr val="accent1"/>
+          </a:effectRef>
+          <a:fontRef idx="minor">
+            <a:schemeClr val="lt1"/>
+          </a:fontRef>
+        </p:style>
+        <p:txBody>
+          <a:bodyPr rtlCol="0" anchor="ctr"/>
+          <a:lstStyle/>
+          <a:p>
+            <a:pPr algn="ctr"/>
+            <a:endParaRPr lang="en-US"/>
+          </a:p>
+        </p:txBody>
+      </p:sp>
+      <p:cxnSp>
+        <p:nvCxnSpPr>
+          <p:cNvPr id="28" name="Straight Arrow Connector 27">
+            <a:extLst>
+              <a:ext uri="{FF2B5EF4-FFF2-40B4-BE49-F238E27FC236}">
+                <a16:creationId xmlns:a16="http://schemas.microsoft.com/office/drawing/2014/main" id="{4647B2C6-495D-4195-B59D-5AF385EEB8DA}"/>
+              </a:ext>
+            </a:extLst>
+          </p:cNvPr>
+          <p:cNvCxnSpPr>
+            <a:cxnSpLocks/>
+          </p:cNvCxnSpPr>
+          <p:nvPr/>
+        </p:nvCxnSpPr>
+        <p:spPr>
+          <a:xfrm>
+            <a:off x="2664201" y="6029646"/>
+            <a:ext cx="0" cy="358588"/>
+          </a:xfrm>
+          <a:prstGeom prst="straightConnector1">
+            <a:avLst/>
+          </a:prstGeom>
+          <a:ln>
+            <a:tailEnd type="triangle"/>
+          </a:ln>
+        </p:spPr>
+        <p:style>
+          <a:lnRef idx="1">
+            <a:schemeClr val="dk1"/>
+          </a:lnRef>
+          <a:fillRef idx="0">
+            <a:schemeClr val="dk1"/>
+          </a:fillRef>
+          <a:effectRef idx="0">
+            <a:schemeClr val="dk1"/>
+          </a:effectRef>
+          <a:fontRef idx="minor">
+            <a:schemeClr val="tx1"/>
+          </a:fontRef>
+        </p:style>
+      </p:cxnSp>
+      <p:cxnSp>
+        <p:nvCxnSpPr>
+          <p:cNvPr id="29" name="Straight Arrow Connector 28">
+            <a:extLst>
+              <a:ext uri="{FF2B5EF4-FFF2-40B4-BE49-F238E27FC236}">
+                <a16:creationId xmlns:a16="http://schemas.microsoft.com/office/drawing/2014/main" id="{EDA79CC5-4194-49E1-BFE5-EE858DE6EF8D}"/>
+              </a:ext>
+            </a:extLst>
+          </p:cNvPr>
+          <p:cNvCxnSpPr>
+            <a:cxnSpLocks/>
+          </p:cNvCxnSpPr>
+          <p:nvPr/>
+        </p:nvCxnSpPr>
+        <p:spPr>
+          <a:xfrm>
+            <a:off x="4111441" y="6029646"/>
+            <a:ext cx="0" cy="358588"/>
+          </a:xfrm>
+          <a:prstGeom prst="straightConnector1">
+            <a:avLst/>
+          </a:prstGeom>
+          <a:ln>
+            <a:tailEnd type="triangle"/>
+          </a:ln>
+        </p:spPr>
+        <p:style>
+          <a:lnRef idx="1">
+            <a:schemeClr val="dk1"/>
+          </a:lnRef>
+          <a:fillRef idx="0">
+            <a:schemeClr val="dk1"/>
+          </a:fillRef>
+          <a:effectRef idx="0">
+            <a:schemeClr val="dk1"/>
+          </a:effectRef>
+          <a:fontRef idx="minor">
+            <a:schemeClr val="tx1"/>
+          </a:fontRef>
+        </p:style>
+      </p:cxnSp>
+      <p:sp>
+        <p:nvSpPr>
+          <p:cNvPr id="30" name="TextBox 29">
+            <a:extLst>
+              <a:ext uri="{FF2B5EF4-FFF2-40B4-BE49-F238E27FC236}">
+                <a16:creationId xmlns:a16="http://schemas.microsoft.com/office/drawing/2014/main" id="{9CE98BE2-ABB8-47E8-B2A1-F0C6C8241519}"/>
+              </a:ext>
+            </a:extLst>
+          </p:cNvPr>
+          <p:cNvSpPr txBox="1"/>
+          <p:nvPr/>
+        </p:nvSpPr>
+        <p:spPr>
+          <a:xfrm>
+            <a:off x="296957" y="6337923"/>
+            <a:ext cx="1835522" cy="584775"/>
+          </a:xfrm>
+          <a:prstGeom prst="rect">
+            <a:avLst/>
+          </a:prstGeom>
+          <a:noFill/>
+        </p:spPr>
+        <p:txBody>
+          <a:bodyPr wrap="square" rtlCol="0">
+            <a:spAutoFit/>
+          </a:bodyPr>
+          <a:lstStyle/>
+          <a:p>
+            <a:pPr algn="ctr"/>
+            <a:r>
+              <a:rPr lang="en-US" sz="1600" dirty="0"/>
+              <a:t>estimated Hb fraction in Y</a:t>
+            </a:r>
+          </a:p>
+        </p:txBody>
+      </p:sp>
+      <p:sp>
+        <p:nvSpPr>
+          <p:cNvPr id="31" name="TextBox 30">
+            <a:extLst>
+              <a:ext uri="{FF2B5EF4-FFF2-40B4-BE49-F238E27FC236}">
+                <a16:creationId xmlns:a16="http://schemas.microsoft.com/office/drawing/2014/main" id="{E8F57E7A-E46E-489A-9BD4-9EE38E4BECC8}"/>
+              </a:ext>
+            </a:extLst>
+          </p:cNvPr>
+          <p:cNvSpPr txBox="1"/>
+          <p:nvPr/>
+        </p:nvSpPr>
+        <p:spPr>
+          <a:xfrm>
+            <a:off x="1752599" y="6337922"/>
+            <a:ext cx="1835522" cy="584775"/>
+          </a:xfrm>
+          <a:prstGeom prst="rect">
+            <a:avLst/>
+          </a:prstGeom>
+          <a:noFill/>
+        </p:spPr>
+        <p:txBody>
+          <a:bodyPr wrap="square" rtlCol="0">
+            <a:spAutoFit/>
+          </a:bodyPr>
+          <a:lstStyle/>
+          <a:p>
+            <a:pPr algn="ctr"/>
+            <a:r>
+              <a:rPr lang="en-US" sz="1600" dirty="0"/>
+              <a:t>estimated O2 fraction in Y</a:t>
+            </a:r>
+          </a:p>
+        </p:txBody>
+      </p:sp>
+      <p:sp>
+        <p:nvSpPr>
+          <p:cNvPr id="32" name="TextBox 31">
+            <a:extLst>
+              <a:ext uri="{FF2B5EF4-FFF2-40B4-BE49-F238E27FC236}">
+                <a16:creationId xmlns:a16="http://schemas.microsoft.com/office/drawing/2014/main" id="{5D6A8F21-0862-4C0C-81B9-814266A25B0C}"/>
+              </a:ext>
+            </a:extLst>
+          </p:cNvPr>
+          <p:cNvSpPr txBox="1"/>
+          <p:nvPr/>
+        </p:nvSpPr>
+        <p:spPr>
+          <a:xfrm>
+            <a:off x="3208241" y="6337922"/>
+            <a:ext cx="1835522" cy="584775"/>
+          </a:xfrm>
+          <a:prstGeom prst="rect">
+            <a:avLst/>
+          </a:prstGeom>
+          <a:noFill/>
+        </p:spPr>
+        <p:txBody>
+          <a:bodyPr wrap="square" rtlCol="0">
+            <a:spAutoFit/>
+          </a:bodyPr>
+          <a:lstStyle/>
+          <a:p>
+            <a:pPr algn="ctr"/>
+            <a:r>
+              <a:rPr lang="en-US" sz="1600" dirty="0"/>
+              <a:t>estimated ICG fraction in Y</a:t>
+            </a:r>
+          </a:p>
+        </p:txBody>
+      </p:sp>
+      <p:cxnSp>
+        <p:nvCxnSpPr>
+          <p:cNvPr id="34" name="Straight Connector 33">
+            <a:extLst>
+              <a:ext uri="{FF2B5EF4-FFF2-40B4-BE49-F238E27FC236}">
+                <a16:creationId xmlns:a16="http://schemas.microsoft.com/office/drawing/2014/main" id="{E2D99A81-B937-4F04-A6FE-AFA2D80F9D92}"/>
+              </a:ext>
+            </a:extLst>
+          </p:cNvPr>
+          <p:cNvCxnSpPr/>
+          <p:nvPr/>
+        </p:nvCxnSpPr>
+        <p:spPr>
+          <a:xfrm>
+            <a:off x="5043763" y="6029646"/>
+            <a:ext cx="0" cy="179294"/>
+          </a:xfrm>
+          <a:prstGeom prst="line">
+            <a:avLst/>
+          </a:prstGeom>
+          <a:ln>
+            <a:solidFill>
+              <a:schemeClr val="tx1"/>
+            </a:solidFill>
+          </a:ln>
+        </p:spPr>
+        <p:style>
+          <a:lnRef idx="1">
+            <a:schemeClr val="accent1"/>
+          </a:lnRef>
+          <a:fillRef idx="0">
+            <a:schemeClr val="accent1"/>
+          </a:fillRef>
+          <a:effectRef idx="0">
+            <a:schemeClr val="accent1"/>
+          </a:effectRef>
+          <a:fontRef idx="minor">
+            <a:schemeClr val="tx1"/>
+          </a:fontRef>
+        </p:style>
+      </p:cxnSp>
+      <p:cxnSp>
+        <p:nvCxnSpPr>
+          <p:cNvPr id="36" name="Straight Connector 35">
+            <a:extLst>
+              <a:ext uri="{FF2B5EF4-FFF2-40B4-BE49-F238E27FC236}">
+                <a16:creationId xmlns:a16="http://schemas.microsoft.com/office/drawing/2014/main" id="{0F18D1E1-29A2-4DB8-9F49-7E02CA0E383C}"/>
+              </a:ext>
+            </a:extLst>
+          </p:cNvPr>
+          <p:cNvCxnSpPr/>
+          <p:nvPr/>
+        </p:nvCxnSpPr>
+        <p:spPr>
+          <a:xfrm>
+            <a:off x="5043763" y="6208940"/>
+            <a:ext cx="855011" cy="0"/>
+          </a:xfrm>
+          <a:prstGeom prst="line">
+            <a:avLst/>
+          </a:prstGeom>
+          <a:ln>
+            <a:tailEnd type="triangle"/>
+          </a:ln>
+        </p:spPr>
+        <p:style>
+          <a:lnRef idx="1">
+            <a:schemeClr val="dk1"/>
+          </a:lnRef>
+          <a:fillRef idx="0">
+            <a:schemeClr val="dk1"/>
+          </a:fillRef>
+          <a:effectRef idx="0">
+            <a:schemeClr val="dk1"/>
+          </a:effectRef>
+          <a:fontRef idx="minor">
+            <a:schemeClr val="tx1"/>
+          </a:fontRef>
+        </p:style>
+      </p:cxnSp>
+      <p:sp>
+        <p:nvSpPr>
+          <p:cNvPr id="37" name="TextBox 36">
+            <a:extLst>
+              <a:ext uri="{FF2B5EF4-FFF2-40B4-BE49-F238E27FC236}">
+                <a16:creationId xmlns:a16="http://schemas.microsoft.com/office/drawing/2014/main" id="{15F0C763-22F0-4104-83CA-6498A9DBB1F2}"/>
+              </a:ext>
+            </a:extLst>
+          </p:cNvPr>
+          <p:cNvSpPr txBox="1"/>
+          <p:nvPr/>
+        </p:nvSpPr>
+        <p:spPr>
+          <a:xfrm>
+            <a:off x="5895409" y="5747275"/>
+            <a:ext cx="5799042" cy="923330"/>
+          </a:xfrm>
+          <a:prstGeom prst="rect">
+            <a:avLst/>
+          </a:prstGeom>
+          <a:noFill/>
+        </p:spPr>
+        <p:txBody>
+          <a:bodyPr wrap="square" rtlCol="0">
+            <a:spAutoFit/>
+          </a:bodyPr>
+          <a:lstStyle/>
+          <a:p>
+            <a:r>
+              <a:rPr lang="en-US" dirty="0"/>
+              <a:t>estimate B1, B2, and B3 using linear regression with nonnegative least squares, to ensure you don’t get negative fractional components.</a:t>
+            </a:r>
+          </a:p>
+        </p:txBody>
+      </p:sp>
+    </p:spTree>
+    <p:extLst>
+      <p:ext uri="{BB962C8B-B14F-4D97-AF65-F5344CB8AC3E}">
+        <p14:creationId xmlns:p14="http://schemas.microsoft.com/office/powerpoint/2010/main" val="3461301916"/>
+      </p:ext>
+    </p:extLst>
+  </p:cSld>
+  <p:clrMapOvr>
+    <a:masterClrMapping/>
+  </p:clrMapOvr>
+</p:sld>
+</file>
+
+<file path=ppt/slides/slide6.xml><?xml version="1.0" encoding="utf-8"?>
+<p:sld xmlns:a="http://schemas.openxmlformats.org/drawingml/2006/main" xmlns:r="http://schemas.openxmlformats.org/officeDocument/2006/relationships" xmlns:p="http://schemas.openxmlformats.org/presentationml/2006/main">
+  <p:cSld>
+    <p:spTree>
+      <p:nvGrpSpPr>
+        <p:cNvPr id="1" name=""/>
+        <p:cNvGrpSpPr/>
+        <p:nvPr/>
+      </p:nvGrpSpPr>
+      <p:grpSpPr>
+        <a:xfrm>
+          <a:off x="0" y="0"/>
+          <a:ext cx="0" cy="0"/>
+          <a:chOff x="0" y="0"/>
+          <a:chExt cx="0" cy="0"/>
+        </a:xfrm>
+      </p:grpSpPr>
+      <p:sp>
+        <p:nvSpPr>
+          <p:cNvPr id="2" name="Title 1">
+            <a:extLst>
+              <a:ext uri="{FF2B5EF4-FFF2-40B4-BE49-F238E27FC236}">
+                <a16:creationId xmlns:a16="http://schemas.microsoft.com/office/drawing/2014/main" id="{EAB4C2F3-4F70-4283-9A80-4338A0A2701D}"/>
+              </a:ext>
+            </a:extLst>
+          </p:cNvPr>
+          <p:cNvSpPr>
+            <a:spLocks noGrp="1"/>
+          </p:cNvSpPr>
+          <p:nvPr>
+            <p:ph type="title"/>
+          </p:nvPr>
+        </p:nvSpPr>
+        <p:spPr>
+          <a:xfrm>
+            <a:off x="838200" y="69288"/>
+            <a:ext cx="10515600" cy="1325563"/>
+          </a:xfrm>
+        </p:spPr>
+        <p:txBody>
+          <a:bodyPr>
+            <a:normAutofit/>
+          </a:bodyPr>
+          <a:lstStyle/>
+          <a:p>
+            <a:r>
+              <a:rPr lang="en-US" sz="4000" b="1" dirty="0"/>
+              <a:t>Studied possible machine learning alternative</a:t>
+            </a:r>
+          </a:p>
+        </p:txBody>
+      </p:sp>
+      <p:graphicFrame>
+        <p:nvGraphicFramePr>
+          <p:cNvPr id="6" name="Table 6">
+            <a:extLst>
+              <a:ext uri="{FF2B5EF4-FFF2-40B4-BE49-F238E27FC236}">
+                <a16:creationId xmlns:a16="http://schemas.microsoft.com/office/drawing/2014/main" id="{FB4E69D8-B061-4335-B65A-902631655F23}"/>
+              </a:ext>
+            </a:extLst>
+          </p:cNvPr>
+          <p:cNvGraphicFramePr>
+            <a:graphicFrameLocks noGrp="1"/>
+          </p:cNvGraphicFramePr>
+          <p:nvPr>
+            <p:extLst>
+              <p:ext uri="{D42A27DB-BD31-4B8C-83A1-F6EECF244321}">
+                <p14:modId xmlns:p14="http://schemas.microsoft.com/office/powerpoint/2010/main" val="3983769533"/>
+              </p:ext>
+            </p:extLst>
+          </p:nvPr>
+        </p:nvGraphicFramePr>
+        <p:xfrm>
+          <a:off x="147913" y="1327261"/>
+          <a:ext cx="7209162" cy="2910828"/>
+        </p:xfrm>
+        <a:graphic>
+          <a:graphicData uri="http://schemas.openxmlformats.org/drawingml/2006/table">
+            <a:tbl>
+              <a:tblPr firstRow="1" bandRow="1">
+                <a:tableStyleId>{5C22544A-7EE6-4342-B048-85BDC9FD1C3A}</a:tableStyleId>
+              </a:tblPr>
+              <a:tblGrid>
+                <a:gridCol w="1432129">
+                  <a:extLst>
+                    <a:ext uri="{9D8B030D-6E8A-4147-A177-3AD203B41FA5}">
+                      <a16:colId xmlns:a16="http://schemas.microsoft.com/office/drawing/2014/main" val="3058952261"/>
+                    </a:ext>
+                  </a:extLst>
+                </a:gridCol>
+                <a:gridCol w="1532693">
+                  <a:extLst>
+                    <a:ext uri="{9D8B030D-6E8A-4147-A177-3AD203B41FA5}">
+                      <a16:colId xmlns:a16="http://schemas.microsoft.com/office/drawing/2014/main" val="1233416698"/>
+                    </a:ext>
+                  </a:extLst>
+                </a:gridCol>
+                <a:gridCol w="1609605">
+                  <a:extLst>
+                    <a:ext uri="{9D8B030D-6E8A-4147-A177-3AD203B41FA5}">
+                      <a16:colId xmlns:a16="http://schemas.microsoft.com/office/drawing/2014/main" val="3002192346"/>
+                    </a:ext>
+                  </a:extLst>
+                </a:gridCol>
+                <a:gridCol w="1332086">
+                  <a:extLst>
+                    <a:ext uri="{9D8B030D-6E8A-4147-A177-3AD203B41FA5}">
+                      <a16:colId xmlns:a16="http://schemas.microsoft.com/office/drawing/2014/main" val="2150674968"/>
+                    </a:ext>
+                  </a:extLst>
+                </a:gridCol>
+                <a:gridCol w="1302649">
+                  <a:extLst>
+                    <a:ext uri="{9D8B030D-6E8A-4147-A177-3AD203B41FA5}">
+                      <a16:colId xmlns:a16="http://schemas.microsoft.com/office/drawing/2014/main" val="16025062"/>
+                    </a:ext>
+                  </a:extLst>
+                </a:gridCol>
+              </a:tblGrid>
+              <a:tr h="634436">
+                <a:tc>
+                  <a:txBody>
+                    <a:bodyPr/>
+                    <a:lstStyle/>
+                    <a:p>
+                      <a:pPr algn="ctr"/>
+                      <a:r>
+                        <a:rPr lang="en-US" dirty="0"/>
+                        <a:t>Y1</a:t>
+                      </a:r>
+                    </a:p>
+                    <a:p>
+                      <a:pPr algn="ctr"/>
+                      <a:r>
+                        <a:rPr lang="en-US" dirty="0"/>
+                        <a:t>(Hb fraction)</a:t>
+                      </a:r>
+                    </a:p>
+                  </a:txBody>
+                  <a:tcPr/>
+                </a:tc>
+                <a:tc>
+                  <a:txBody>
+                    <a:bodyPr/>
+                    <a:lstStyle/>
+                    <a:p>
+                      <a:pPr algn="ctr"/>
+                      <a:r>
+                        <a:rPr lang="en-US" dirty="0"/>
+                        <a:t>Y2</a:t>
+                      </a:r>
+                    </a:p>
+                    <a:p>
+                      <a:pPr algn="ctr"/>
+                      <a:r>
+                        <a:rPr lang="en-US" dirty="0"/>
+                        <a:t>(O2 fraction)</a:t>
+                      </a:r>
+                    </a:p>
+                  </a:txBody>
+                  <a:tcPr/>
+                </a:tc>
+                <a:tc>
+                  <a:txBody>
+                    <a:bodyPr/>
+                    <a:lstStyle/>
+                    <a:p>
+                      <a:pPr algn="ctr"/>
+                      <a:r>
+                        <a:rPr lang="en-US" dirty="0"/>
+                        <a:t>Y3</a:t>
+                      </a:r>
+                    </a:p>
+                    <a:p>
+                      <a:pPr algn="ctr"/>
+                      <a:r>
+                        <a:rPr lang="en-US" dirty="0"/>
+                        <a:t>(ICG fraction)</a:t>
+                      </a:r>
+                    </a:p>
+                  </a:txBody>
+                  <a:tcPr/>
+                </a:tc>
+                <a:tc>
+                  <a:txBody>
+                    <a:bodyPr/>
+                    <a:lstStyle/>
+                    <a:p>
+                      <a:pPr algn="ctr"/>
+                      <a:r>
+                        <a:rPr lang="en-US" dirty="0"/>
+                        <a:t>X1</a:t>
+                      </a:r>
+                    </a:p>
+                    <a:p>
+                      <a:pPr algn="ctr"/>
+                      <a:endParaRPr lang="en-US" dirty="0"/>
+                    </a:p>
+                  </a:txBody>
+                  <a:tcPr/>
+                </a:tc>
+                <a:tc>
+                  <a:txBody>
+                    <a:bodyPr/>
+                    <a:lstStyle/>
+                    <a:p>
+                      <a:pPr algn="ctr"/>
+                      <a:r>
+                        <a:rPr lang="en-US" dirty="0"/>
+                        <a:t>X2</a:t>
+                      </a:r>
+                    </a:p>
+                  </a:txBody>
+                  <a:tcPr/>
+                </a:tc>
+                <a:extLst>
+                  <a:ext uri="{0D108BD9-81ED-4DB2-BD59-A6C34878D82A}">
+                    <a16:rowId xmlns:a16="http://schemas.microsoft.com/office/drawing/2014/main" val="3591867232"/>
+                  </a:ext>
+                </a:extLst>
+              </a:tr>
+              <a:tr h="378458">
+                <a:tc>
+                  <a:txBody>
+                    <a:bodyPr/>
+                    <a:lstStyle/>
+                    <a:p>
+                      <a:pPr algn="ctr"/>
+                      <a:r>
+                        <a:rPr lang="en-US" dirty="0"/>
+                        <a:t>1</a:t>
+                      </a:r>
+                    </a:p>
+                  </a:txBody>
+                  <a:tcPr/>
+                </a:tc>
+                <a:tc>
+                  <a:txBody>
+                    <a:bodyPr/>
+                    <a:lstStyle/>
+                    <a:p>
+                      <a:pPr algn="ctr"/>
+                      <a:r>
+                        <a:rPr lang="en-US" dirty="0"/>
+                        <a:t>0</a:t>
+                      </a:r>
+                    </a:p>
+                  </a:txBody>
+                  <a:tcPr/>
+                </a:tc>
+                <a:tc>
+                  <a:txBody>
+                    <a:bodyPr/>
+                    <a:lstStyle/>
+                    <a:p>
+                      <a:pPr algn="ctr"/>
+                      <a:r>
+                        <a:rPr lang="en-US" dirty="0"/>
+                        <a:t>0</a:t>
+                      </a:r>
+                    </a:p>
+                  </a:txBody>
+                  <a:tcPr/>
+                </a:tc>
+                <a:tc>
+                  <a:txBody>
+                    <a:bodyPr/>
+                    <a:lstStyle/>
+                    <a:p>
+                      <a:pPr algn="ctr"/>
+                      <a:endParaRPr lang="en-US" dirty="0"/>
+                    </a:p>
+                  </a:txBody>
+                  <a:tcPr/>
+                </a:tc>
+                <a:tc>
+                  <a:txBody>
+                    <a:bodyPr/>
+                    <a:lstStyle/>
+                    <a:p>
+                      <a:pPr algn="ctr"/>
+                      <a:endParaRPr lang="en-US" dirty="0"/>
+                    </a:p>
+                  </a:txBody>
+                  <a:tcPr/>
+                </a:tc>
+                <a:extLst>
+                  <a:ext uri="{0D108BD9-81ED-4DB2-BD59-A6C34878D82A}">
+                    <a16:rowId xmlns:a16="http://schemas.microsoft.com/office/drawing/2014/main" val="4280959929"/>
+                  </a:ext>
+                </a:extLst>
+              </a:tr>
+              <a:tr h="378458">
+                <a:tc>
+                  <a:txBody>
+                    <a:bodyPr/>
+                    <a:lstStyle/>
+                    <a:p>
+                      <a:pPr algn="ctr"/>
+                      <a:r>
+                        <a:rPr lang="en-US" dirty="0"/>
+                        <a:t>0.9</a:t>
+                      </a:r>
+                    </a:p>
+                  </a:txBody>
+                  <a:tcPr/>
+                </a:tc>
+                <a:tc>
+                  <a:txBody>
+                    <a:bodyPr/>
+                    <a:lstStyle/>
+                    <a:p>
+                      <a:pPr algn="ctr"/>
+                      <a:r>
+                        <a:rPr lang="en-US" dirty="0"/>
+                        <a:t>0.1</a:t>
+                      </a:r>
+                    </a:p>
+                  </a:txBody>
+                  <a:tcPr/>
+                </a:tc>
+                <a:tc>
+                  <a:txBody>
+                    <a:bodyPr/>
+                    <a:lstStyle/>
+                    <a:p>
+                      <a:pPr algn="ctr"/>
+                      <a:r>
+                        <a:rPr lang="en-US" dirty="0"/>
+                        <a:t>0</a:t>
+                      </a:r>
+                    </a:p>
+                  </a:txBody>
+                  <a:tcPr/>
+                </a:tc>
+                <a:tc>
+                  <a:txBody>
+                    <a:bodyPr/>
+                    <a:lstStyle/>
+                    <a:p>
+                      <a:pPr algn="ctr"/>
+                      <a:endParaRPr lang="en-US" dirty="0"/>
+                    </a:p>
+                  </a:txBody>
+                  <a:tcPr/>
+                </a:tc>
+                <a:tc>
+                  <a:txBody>
+                    <a:bodyPr/>
+                    <a:lstStyle/>
+                    <a:p>
+                      <a:pPr algn="ctr"/>
+                      <a:endParaRPr lang="en-US" dirty="0"/>
+                    </a:p>
+                  </a:txBody>
+                  <a:tcPr/>
+                </a:tc>
+                <a:extLst>
+                  <a:ext uri="{0D108BD9-81ED-4DB2-BD59-A6C34878D82A}">
+                    <a16:rowId xmlns:a16="http://schemas.microsoft.com/office/drawing/2014/main" val="1624402395"/>
+                  </a:ext>
+                </a:extLst>
+              </a:tr>
+              <a:tr h="378458">
+                <a:tc>
+                  <a:txBody>
+                    <a:bodyPr/>
+                    <a:lstStyle/>
+                    <a:p>
+                      <a:pPr algn="ctr"/>
+                      <a:r>
+                        <a:rPr lang="en-US" dirty="0"/>
+                        <a:t>0.8</a:t>
+                      </a:r>
+                    </a:p>
+                  </a:txBody>
+                  <a:tcPr/>
+                </a:tc>
+                <a:tc>
+                  <a:txBody>
+                    <a:bodyPr/>
+                    <a:lstStyle/>
+                    <a:p>
+                      <a:pPr algn="ctr"/>
+                      <a:r>
+                        <a:rPr lang="en-US" dirty="0"/>
+                        <a:t>0.2</a:t>
+                      </a:r>
+                    </a:p>
+                  </a:txBody>
+                  <a:tcPr/>
+                </a:tc>
+                <a:tc>
+                  <a:txBody>
+                    <a:bodyPr/>
+                    <a:lstStyle/>
+                    <a:p>
+                      <a:pPr algn="ctr"/>
+                      <a:r>
+                        <a:rPr lang="en-US" dirty="0"/>
+                        <a:t>0</a:t>
+                      </a:r>
+                    </a:p>
+                  </a:txBody>
+                  <a:tcPr/>
+                </a:tc>
+                <a:tc>
+                  <a:txBody>
+                    <a:bodyPr/>
+                    <a:lstStyle/>
+                    <a:p>
+                      <a:pPr algn="ctr"/>
+                      <a:endParaRPr lang="en-US" dirty="0"/>
+                    </a:p>
+                  </a:txBody>
+                  <a:tcPr/>
+                </a:tc>
+                <a:tc>
+                  <a:txBody>
+                    <a:bodyPr/>
+                    <a:lstStyle/>
+                    <a:p>
+                      <a:pPr algn="ctr"/>
+                      <a:endParaRPr lang="en-US" dirty="0"/>
+                    </a:p>
+                  </a:txBody>
+                  <a:tcPr/>
+                </a:tc>
+                <a:extLst>
+                  <a:ext uri="{0D108BD9-81ED-4DB2-BD59-A6C34878D82A}">
+                    <a16:rowId xmlns:a16="http://schemas.microsoft.com/office/drawing/2014/main" val="1021223636"/>
+                  </a:ext>
+                </a:extLst>
+              </a:tr>
+              <a:tr h="378458">
+                <a:tc>
+                  <a:txBody>
+                    <a:bodyPr/>
+                    <a:lstStyle/>
+                    <a:p>
+                      <a:pPr algn="ctr"/>
+                      <a:r>
+                        <a:rPr lang="en-US" dirty="0"/>
+                        <a:t>0.7</a:t>
+                      </a:r>
+                    </a:p>
+                  </a:txBody>
+                  <a:tcPr/>
+                </a:tc>
+                <a:tc>
+                  <a:txBody>
+                    <a:bodyPr/>
+                    <a:lstStyle/>
+                    <a:p>
+                      <a:pPr algn="ctr"/>
+                      <a:r>
+                        <a:rPr lang="en-US" dirty="0"/>
+                        <a:t>0.3</a:t>
+                      </a:r>
+                    </a:p>
+                  </a:txBody>
+                  <a:tcPr/>
+                </a:tc>
+                <a:tc>
+                  <a:txBody>
+                    <a:bodyPr/>
+                    <a:lstStyle/>
+                    <a:p>
+                      <a:pPr algn="ctr"/>
+                      <a:r>
+                        <a:rPr lang="en-US" dirty="0"/>
+                        <a:t>0</a:t>
+                      </a:r>
+                    </a:p>
+                  </a:txBody>
+                  <a:tcPr/>
+                </a:tc>
+                <a:tc>
+                  <a:txBody>
+                    <a:bodyPr/>
+                    <a:lstStyle/>
+                    <a:p>
+                      <a:pPr algn="ctr"/>
+                      <a:endParaRPr lang="en-US" dirty="0"/>
+                    </a:p>
+                  </a:txBody>
+                  <a:tcPr/>
+                </a:tc>
+                <a:tc>
+                  <a:txBody>
+                    <a:bodyPr/>
+                    <a:lstStyle/>
+                    <a:p>
+                      <a:pPr algn="ctr"/>
+                      <a:endParaRPr lang="en-US" dirty="0"/>
+                    </a:p>
+                  </a:txBody>
+                  <a:tcPr/>
+                </a:tc>
+                <a:extLst>
+                  <a:ext uri="{0D108BD9-81ED-4DB2-BD59-A6C34878D82A}">
+                    <a16:rowId xmlns:a16="http://schemas.microsoft.com/office/drawing/2014/main" val="589177795"/>
+                  </a:ext>
+                </a:extLst>
+              </a:tr>
+              <a:tr h="378458">
+                <a:tc>
+                  <a:txBody>
+                    <a:bodyPr/>
+                    <a:lstStyle/>
+                    <a:p>
+                      <a:pPr algn="ctr"/>
+                      <a:r>
+                        <a:rPr lang="en-US" dirty="0"/>
+                        <a:t>0.6</a:t>
+                      </a:r>
+                    </a:p>
+                  </a:txBody>
+                  <a:tcPr/>
+                </a:tc>
+                <a:tc>
+                  <a:txBody>
+                    <a:bodyPr/>
+                    <a:lstStyle/>
+                    <a:p>
+                      <a:pPr algn="ctr"/>
+                      <a:r>
+                        <a:rPr lang="en-US" dirty="0"/>
+                        <a:t>0.4</a:t>
+                      </a:r>
+                    </a:p>
+                  </a:txBody>
+                  <a:tcPr/>
+                </a:tc>
+                <a:tc>
+                  <a:txBody>
+                    <a:bodyPr/>
+                    <a:lstStyle/>
+                    <a:p>
+                      <a:pPr algn="ctr"/>
+                      <a:r>
+                        <a:rPr lang="en-US" dirty="0"/>
+                        <a:t>0</a:t>
+                      </a:r>
+                    </a:p>
+                  </a:txBody>
+                  <a:tcPr/>
+                </a:tc>
+                <a:tc>
+                  <a:txBody>
+                    <a:bodyPr/>
+                    <a:lstStyle/>
+                    <a:p>
+                      <a:pPr algn="ctr"/>
+                      <a:endParaRPr lang="en-US" dirty="0"/>
+                    </a:p>
+                  </a:txBody>
+                  <a:tcPr/>
+                </a:tc>
+                <a:tc>
+                  <a:txBody>
+                    <a:bodyPr/>
+                    <a:lstStyle/>
+                    <a:p>
+                      <a:pPr algn="ctr"/>
+                      <a:endParaRPr lang="en-US" dirty="0"/>
+                    </a:p>
+                  </a:txBody>
+                  <a:tcPr/>
+                </a:tc>
+                <a:extLst>
+                  <a:ext uri="{0D108BD9-81ED-4DB2-BD59-A6C34878D82A}">
+                    <a16:rowId xmlns:a16="http://schemas.microsoft.com/office/drawing/2014/main" val="4023027451"/>
+                  </a:ext>
+                </a:extLst>
+              </a:tr>
+              <a:tr h="378458">
+                <a:tc>
+                  <a:txBody>
+                    <a:bodyPr/>
+                    <a:lstStyle/>
+                    <a:p>
+                      <a:pPr algn="ctr"/>
+                      <a:r>
+                        <a:rPr lang="en-US" dirty="0"/>
+                        <a:t>0.5</a:t>
+                      </a:r>
+                    </a:p>
+                  </a:txBody>
+                  <a:tcPr/>
+                </a:tc>
+                <a:tc>
+                  <a:txBody>
+                    <a:bodyPr/>
+                    <a:lstStyle/>
+                    <a:p>
+                      <a:pPr algn="ctr"/>
+                      <a:r>
+                        <a:rPr lang="en-US" dirty="0"/>
+                        <a:t>0.5</a:t>
+                      </a:r>
+                    </a:p>
+                  </a:txBody>
+                  <a:tcPr/>
+                </a:tc>
+                <a:tc>
+                  <a:txBody>
+                    <a:bodyPr/>
+                    <a:lstStyle/>
+                    <a:p>
+                      <a:pPr algn="ctr"/>
+                      <a:r>
+                        <a:rPr lang="en-US" dirty="0"/>
+                        <a:t>0</a:t>
+                      </a:r>
+                    </a:p>
+                  </a:txBody>
+                  <a:tcPr/>
+                </a:tc>
+                <a:tc>
+                  <a:txBody>
+                    <a:bodyPr/>
+                    <a:lstStyle/>
+                    <a:p>
+                      <a:pPr algn="ctr"/>
+                      <a:endParaRPr lang="en-US" dirty="0"/>
+                    </a:p>
+                  </a:txBody>
+                  <a:tcPr/>
+                </a:tc>
+                <a:tc>
+                  <a:txBody>
+                    <a:bodyPr/>
+                    <a:lstStyle/>
+                    <a:p>
+                      <a:pPr algn="ctr"/>
+                      <a:endParaRPr lang="en-US" dirty="0"/>
+                    </a:p>
+                  </a:txBody>
+                  <a:tcPr/>
+                </a:tc>
+                <a:extLst>
+                  <a:ext uri="{0D108BD9-81ED-4DB2-BD59-A6C34878D82A}">
+                    <a16:rowId xmlns:a16="http://schemas.microsoft.com/office/drawing/2014/main" val="3000121794"/>
+                  </a:ext>
+                </a:extLst>
+              </a:tr>
+            </a:tbl>
+          </a:graphicData>
+        </a:graphic>
+      </p:graphicFrame>
+      <p:sp>
+        <p:nvSpPr>
+          <p:cNvPr id="7" name="TextBox 6">
+            <a:extLst>
+              <a:ext uri="{FF2B5EF4-FFF2-40B4-BE49-F238E27FC236}">
+                <a16:creationId xmlns:a16="http://schemas.microsoft.com/office/drawing/2014/main" id="{2E2C6D67-0262-4EDC-B1EB-F9A578FEA7AF}"/>
+              </a:ext>
+            </a:extLst>
+          </p:cNvPr>
+          <p:cNvSpPr txBox="1"/>
+          <p:nvPr/>
+        </p:nvSpPr>
+        <p:spPr>
+          <a:xfrm>
+            <a:off x="147915" y="903305"/>
+            <a:ext cx="1213224" cy="461665"/>
+          </a:xfrm>
+          <a:prstGeom prst="rect">
+            <a:avLst/>
+          </a:prstGeom>
+          <a:noFill/>
+        </p:spPr>
+        <p:txBody>
+          <a:bodyPr wrap="square" rtlCol="0">
+            <a:spAutoFit/>
+          </a:bodyPr>
+          <a:lstStyle/>
+          <a:p>
+            <a:r>
+              <a:rPr lang="en-US" sz="2400" b="1" dirty="0"/>
+              <a:t>Dataset</a:t>
+            </a:r>
+          </a:p>
+        </p:txBody>
+      </p:sp>
+      <p:sp>
+        <p:nvSpPr>
+          <p:cNvPr id="9" name="TextBox 8">
+            <a:extLst>
+              <a:ext uri="{FF2B5EF4-FFF2-40B4-BE49-F238E27FC236}">
+                <a16:creationId xmlns:a16="http://schemas.microsoft.com/office/drawing/2014/main" id="{790DEB60-427D-4BF5-BE4E-0E264C1C7B0F}"/>
+              </a:ext>
+            </a:extLst>
+          </p:cNvPr>
+          <p:cNvSpPr txBox="1"/>
+          <p:nvPr/>
+        </p:nvSpPr>
+        <p:spPr>
+          <a:xfrm rot="16200000">
+            <a:off x="7381123" y="2450702"/>
+            <a:ext cx="475129" cy="523220"/>
+          </a:xfrm>
+          <a:prstGeom prst="rect">
+            <a:avLst/>
+          </a:prstGeom>
+          <a:noFill/>
+        </p:spPr>
+        <p:txBody>
+          <a:bodyPr wrap="square" rtlCol="0">
+            <a:spAutoFit/>
+          </a:bodyPr>
+          <a:lstStyle/>
+          <a:p>
+            <a:r>
+              <a:rPr lang="en-US" sz="2800" dirty="0"/>
+              <a:t>…</a:t>
+            </a:r>
+          </a:p>
+        </p:txBody>
+      </p:sp>
+      <p:graphicFrame>
+        <p:nvGraphicFramePr>
+          <p:cNvPr id="35" name="Table 6">
+            <a:extLst>
+              <a:ext uri="{FF2B5EF4-FFF2-40B4-BE49-F238E27FC236}">
+                <a16:creationId xmlns:a16="http://schemas.microsoft.com/office/drawing/2014/main" id="{28EA80A9-4174-4B1E-BDCF-C2B088DE6055}"/>
+              </a:ext>
+            </a:extLst>
+          </p:cNvPr>
+          <p:cNvGraphicFramePr>
+            <a:graphicFrameLocks noGrp="1"/>
+          </p:cNvGraphicFramePr>
+          <p:nvPr>
+            <p:extLst>
+              <p:ext uri="{D42A27DB-BD31-4B8C-83A1-F6EECF244321}">
+                <p14:modId xmlns:p14="http://schemas.microsoft.com/office/powerpoint/2010/main" val="1292153395"/>
+              </p:ext>
+            </p:extLst>
+          </p:nvPr>
+        </p:nvGraphicFramePr>
+        <p:xfrm>
+          <a:off x="7989624" y="1327261"/>
+          <a:ext cx="1446495" cy="2910828"/>
+        </p:xfrm>
+        <a:graphic>
+          <a:graphicData uri="http://schemas.openxmlformats.org/drawingml/2006/table">
+            <a:tbl>
+              <a:tblPr firstRow="1" bandRow="1">
+                <a:tableStyleId>{5C22544A-7EE6-4342-B048-85BDC9FD1C3A}</a:tableStyleId>
+              </a:tblPr>
+              <a:tblGrid>
+                <a:gridCol w="1446495">
+                  <a:extLst>
+                    <a:ext uri="{9D8B030D-6E8A-4147-A177-3AD203B41FA5}">
+                      <a16:colId xmlns:a16="http://schemas.microsoft.com/office/drawing/2014/main" val="16025062"/>
+                    </a:ext>
+                  </a:extLst>
+                </a:gridCol>
+              </a:tblGrid>
+              <a:tr h="668916">
+                <a:tc>
+                  <a:txBody>
+                    <a:bodyPr/>
+                    <a:lstStyle/>
+                    <a:p>
+                      <a:pPr algn="ctr"/>
+                      <a:r>
+                        <a:rPr lang="en-US" dirty="0" err="1"/>
+                        <a:t>Xn</a:t>
+                      </a:r>
+                      <a:endParaRPr lang="en-US" dirty="0"/>
+                    </a:p>
+                  </a:txBody>
+                  <a:tcPr/>
+                </a:tc>
+                <a:extLst>
+                  <a:ext uri="{0D108BD9-81ED-4DB2-BD59-A6C34878D82A}">
+                    <a16:rowId xmlns:a16="http://schemas.microsoft.com/office/drawing/2014/main" val="3591867232"/>
+                  </a:ext>
+                </a:extLst>
+              </a:tr>
+              <a:tr h="373652">
+                <a:tc>
+                  <a:txBody>
+                    <a:bodyPr/>
+                    <a:lstStyle/>
+                    <a:p>
+                      <a:pPr algn="ctr"/>
+                      <a:endParaRPr lang="en-US" dirty="0"/>
+                    </a:p>
+                  </a:txBody>
+                  <a:tcPr/>
+                </a:tc>
+                <a:extLst>
+                  <a:ext uri="{0D108BD9-81ED-4DB2-BD59-A6C34878D82A}">
+                    <a16:rowId xmlns:a16="http://schemas.microsoft.com/office/drawing/2014/main" val="4280959929"/>
+                  </a:ext>
+                </a:extLst>
+              </a:tr>
+              <a:tr h="373652">
+                <a:tc>
+                  <a:txBody>
+                    <a:bodyPr/>
+                    <a:lstStyle/>
+                    <a:p>
+                      <a:pPr algn="ctr"/>
+                      <a:endParaRPr lang="en-US" dirty="0"/>
+                    </a:p>
+                  </a:txBody>
+                  <a:tcPr/>
+                </a:tc>
+                <a:extLst>
+                  <a:ext uri="{0D108BD9-81ED-4DB2-BD59-A6C34878D82A}">
+                    <a16:rowId xmlns:a16="http://schemas.microsoft.com/office/drawing/2014/main" val="1624402395"/>
+                  </a:ext>
+                </a:extLst>
+              </a:tr>
+              <a:tr h="373652">
+                <a:tc>
+                  <a:txBody>
+                    <a:bodyPr/>
+                    <a:lstStyle/>
+                    <a:p>
+                      <a:pPr algn="ctr"/>
+                      <a:endParaRPr lang="en-US" dirty="0"/>
+                    </a:p>
+                  </a:txBody>
+                  <a:tcPr/>
+                </a:tc>
+                <a:extLst>
+                  <a:ext uri="{0D108BD9-81ED-4DB2-BD59-A6C34878D82A}">
+                    <a16:rowId xmlns:a16="http://schemas.microsoft.com/office/drawing/2014/main" val="1021223636"/>
+                  </a:ext>
+                </a:extLst>
+              </a:tr>
+              <a:tr h="373652">
+                <a:tc>
+                  <a:txBody>
+                    <a:bodyPr/>
+                    <a:lstStyle/>
+                    <a:p>
+                      <a:pPr algn="ctr"/>
+                      <a:endParaRPr lang="en-US" dirty="0"/>
+                    </a:p>
+                  </a:txBody>
+                  <a:tcPr/>
+                </a:tc>
+                <a:extLst>
+                  <a:ext uri="{0D108BD9-81ED-4DB2-BD59-A6C34878D82A}">
+                    <a16:rowId xmlns:a16="http://schemas.microsoft.com/office/drawing/2014/main" val="589177795"/>
+                  </a:ext>
+                </a:extLst>
+              </a:tr>
+              <a:tr h="373652">
+                <a:tc>
+                  <a:txBody>
+                    <a:bodyPr/>
+                    <a:lstStyle/>
+                    <a:p>
+                      <a:pPr algn="ctr"/>
+                      <a:endParaRPr lang="en-US" dirty="0"/>
+                    </a:p>
+                  </a:txBody>
+                  <a:tcPr/>
+                </a:tc>
+                <a:extLst>
+                  <a:ext uri="{0D108BD9-81ED-4DB2-BD59-A6C34878D82A}">
+                    <a16:rowId xmlns:a16="http://schemas.microsoft.com/office/drawing/2014/main" val="4023027451"/>
+                  </a:ext>
+                </a:extLst>
+              </a:tr>
+              <a:tr h="373652">
+                <a:tc>
+                  <a:txBody>
+                    <a:bodyPr/>
+                    <a:lstStyle/>
+                    <a:p>
+                      <a:pPr algn="ctr"/>
+                      <a:endParaRPr lang="en-US" dirty="0"/>
+                    </a:p>
+                  </a:txBody>
+                  <a:tcPr/>
+                </a:tc>
+                <a:extLst>
+                  <a:ext uri="{0D108BD9-81ED-4DB2-BD59-A6C34878D82A}">
+                    <a16:rowId xmlns:a16="http://schemas.microsoft.com/office/drawing/2014/main" val="3000121794"/>
+                  </a:ext>
+                </a:extLst>
+              </a:tr>
+            </a:tbl>
+          </a:graphicData>
+        </a:graphic>
+      </p:graphicFrame>
+      <p:graphicFrame>
+        <p:nvGraphicFramePr>
+          <p:cNvPr id="38" name="Table 6">
+            <a:extLst>
+              <a:ext uri="{FF2B5EF4-FFF2-40B4-BE49-F238E27FC236}">
+                <a16:creationId xmlns:a16="http://schemas.microsoft.com/office/drawing/2014/main" id="{7469E770-6E5D-479D-BD89-894B944BF4D7}"/>
+              </a:ext>
+            </a:extLst>
+          </p:cNvPr>
+          <p:cNvGraphicFramePr>
+            <a:graphicFrameLocks noGrp="1"/>
+          </p:cNvGraphicFramePr>
+          <p:nvPr>
+            <p:extLst>
+              <p:ext uri="{D42A27DB-BD31-4B8C-83A1-F6EECF244321}">
+                <p14:modId xmlns:p14="http://schemas.microsoft.com/office/powerpoint/2010/main" val="1981599546"/>
+              </p:ext>
+            </p:extLst>
+          </p:nvPr>
+        </p:nvGraphicFramePr>
+        <p:xfrm>
+          <a:off x="147913" y="4479165"/>
+          <a:ext cx="7209165" cy="365760"/>
+        </p:xfrm>
+        <a:graphic>
+          <a:graphicData uri="http://schemas.openxmlformats.org/drawingml/2006/table">
+            <a:tbl>
+              <a:tblPr firstRow="1" bandRow="1">
+                <a:tableStyleId>{5C22544A-7EE6-4342-B048-85BDC9FD1C3A}</a:tableStyleId>
+              </a:tblPr>
+              <a:tblGrid>
+                <a:gridCol w="1438840">
+                  <a:extLst>
+                    <a:ext uri="{9D8B030D-6E8A-4147-A177-3AD203B41FA5}">
+                      <a16:colId xmlns:a16="http://schemas.microsoft.com/office/drawing/2014/main" val="3058952261"/>
+                    </a:ext>
+                  </a:extLst>
+                </a:gridCol>
+                <a:gridCol w="1550894">
+                  <a:extLst>
+                    <a:ext uri="{9D8B030D-6E8A-4147-A177-3AD203B41FA5}">
+                      <a16:colId xmlns:a16="http://schemas.microsoft.com/office/drawing/2014/main" val="1233416698"/>
+                    </a:ext>
+                  </a:extLst>
+                </a:gridCol>
+                <a:gridCol w="1595718">
+                  <a:extLst>
+                    <a:ext uri="{9D8B030D-6E8A-4147-A177-3AD203B41FA5}">
+                      <a16:colId xmlns:a16="http://schemas.microsoft.com/office/drawing/2014/main" val="3002192346"/>
+                    </a:ext>
+                  </a:extLst>
+                </a:gridCol>
+                <a:gridCol w="1308847">
+                  <a:extLst>
+                    <a:ext uri="{9D8B030D-6E8A-4147-A177-3AD203B41FA5}">
+                      <a16:colId xmlns:a16="http://schemas.microsoft.com/office/drawing/2014/main" val="2150674968"/>
+                    </a:ext>
+                  </a:extLst>
+                </a:gridCol>
+                <a:gridCol w="1314866">
+                  <a:extLst>
+                    <a:ext uri="{9D8B030D-6E8A-4147-A177-3AD203B41FA5}">
+                      <a16:colId xmlns:a16="http://schemas.microsoft.com/office/drawing/2014/main" val="2760810114"/>
+                    </a:ext>
+                  </a:extLst>
+                </a:gridCol>
+              </a:tblGrid>
+              <a:tr h="345922">
+                <a:tc>
+                  <a:txBody>
+                    <a:bodyPr/>
+                    <a:lstStyle/>
+                    <a:p>
+                      <a:pPr algn="ctr"/>
+                      <a:r>
+                        <a:rPr lang="en-US" b="0" dirty="0">
+                          <a:solidFill>
+                            <a:schemeClr val="tx1"/>
+                          </a:solidFill>
+                        </a:rPr>
+                        <a:t>1</a:t>
+                      </a:r>
+                    </a:p>
+                  </a:txBody>
+                  <a:tcPr>
+                    <a:solidFill>
+                      <a:schemeClr val="accent1">
+                        <a:lumMod val="20000"/>
+                        <a:lumOff val="80000"/>
+                      </a:schemeClr>
+                    </a:solidFill>
+                  </a:tcPr>
+                </a:tc>
+                <a:tc>
+                  <a:txBody>
+                    <a:bodyPr/>
+                    <a:lstStyle/>
+                    <a:p>
+                      <a:pPr algn="ctr"/>
+                      <a:r>
+                        <a:rPr lang="en-US" b="0" dirty="0">
+                          <a:solidFill>
+                            <a:schemeClr val="tx1"/>
+                          </a:solidFill>
+                        </a:rPr>
+                        <a:t>1</a:t>
+                      </a:r>
+                    </a:p>
+                  </a:txBody>
+                  <a:tcPr>
+                    <a:solidFill>
+                      <a:schemeClr val="accent1">
+                        <a:lumMod val="20000"/>
+                        <a:lumOff val="80000"/>
+                      </a:schemeClr>
+                    </a:solidFill>
+                  </a:tcPr>
+                </a:tc>
+                <a:tc>
+                  <a:txBody>
+                    <a:bodyPr/>
+                    <a:lstStyle/>
+                    <a:p>
+                      <a:pPr algn="ctr"/>
+                      <a:r>
+                        <a:rPr lang="en-US" b="0" dirty="0">
+                          <a:solidFill>
+                            <a:schemeClr val="tx1"/>
+                          </a:solidFill>
+                        </a:rPr>
+                        <a:t>1</a:t>
+                      </a:r>
+                    </a:p>
+                  </a:txBody>
+                  <a:tcPr>
+                    <a:solidFill>
+                      <a:schemeClr val="accent1">
+                        <a:lumMod val="20000"/>
+                        <a:lumOff val="80000"/>
+                      </a:schemeClr>
+                    </a:solidFill>
+                  </a:tcPr>
+                </a:tc>
+                <a:tc>
+                  <a:txBody>
+                    <a:bodyPr/>
+                    <a:lstStyle/>
+                    <a:p>
+                      <a:pPr algn="ctr"/>
+                      <a:r>
+                        <a:rPr lang="en-US" b="0" dirty="0">
+                          <a:solidFill>
+                            <a:schemeClr val="tx1"/>
+                          </a:solidFill>
+                        </a:rPr>
+                        <a:t>1</a:t>
+                      </a:r>
+                    </a:p>
+                  </a:txBody>
+                  <a:tcPr>
+                    <a:solidFill>
+                      <a:schemeClr val="accent1">
+                        <a:lumMod val="20000"/>
+                        <a:lumOff val="80000"/>
+                      </a:schemeClr>
+                    </a:solidFill>
+                  </a:tcPr>
+                </a:tc>
+                <a:tc>
+                  <a:txBody>
+                    <a:bodyPr/>
+                    <a:lstStyle/>
+                    <a:p>
+                      <a:pPr algn="ctr"/>
+                      <a:endParaRPr lang="en-US" b="0" dirty="0">
+                        <a:solidFill>
+                          <a:schemeClr val="tx1"/>
+                        </a:solidFill>
+                      </a:endParaRPr>
+                    </a:p>
+                  </a:txBody>
+                  <a:tcPr>
+                    <a:solidFill>
+                      <a:schemeClr val="accent1">
+                        <a:lumMod val="20000"/>
+                        <a:lumOff val="80000"/>
+                      </a:schemeClr>
+                    </a:solidFill>
+                  </a:tcPr>
+                </a:tc>
+                <a:extLst>
+                  <a:ext uri="{0D108BD9-81ED-4DB2-BD59-A6C34878D82A}">
+                    <a16:rowId xmlns:a16="http://schemas.microsoft.com/office/drawing/2014/main" val="1021223636"/>
+                  </a:ext>
+                </a:extLst>
+              </a:tr>
+            </a:tbl>
+          </a:graphicData>
+        </a:graphic>
+      </p:graphicFrame>
+    </p:spTree>
+    <p:extLst>
+      <p:ext uri="{BB962C8B-B14F-4D97-AF65-F5344CB8AC3E}">
+        <p14:creationId xmlns:p14="http://schemas.microsoft.com/office/powerpoint/2010/main" val="807876865"/>
       </p:ext>
     </p:extLst>
   </p:cSld>

</xml_diff>

<commit_message>
update to spectral unmixing ppt
</commit_message>
<xml_diff>
--- a/spectral-unmixing/ppt_presentations/midterm_project_report.pptx
+++ b/spectral-unmixing/ppt_presentations/midterm_project_report.pptx
@@ -11,6 +11,10 @@
     <p:sldId id="259" r:id="rId5"/>
     <p:sldId id="260" r:id="rId6"/>
     <p:sldId id="261" r:id="rId7"/>
+    <p:sldId id="262" r:id="rId8"/>
+    <p:sldId id="263" r:id="rId9"/>
+    <p:sldId id="264" r:id="rId10"/>
+    <p:sldId id="265" r:id="rId11"/>
   </p:sldIdLst>
   <p:sldSz cx="12192000" cy="6858000"/>
   <p:notesSz cx="6858000" cy="9144000"/>
@@ -3414,6 +3418,99 @@
 </p:sld>
 </file>
 
+<file path=ppt/slides/slide10.xml><?xml version="1.0" encoding="utf-8"?>
+<p:sld xmlns:a="http://schemas.openxmlformats.org/drawingml/2006/main" xmlns:r="http://schemas.openxmlformats.org/officeDocument/2006/relationships" xmlns:p="http://schemas.openxmlformats.org/presentationml/2006/main">
+  <p:cSld>
+    <p:spTree>
+      <p:nvGrpSpPr>
+        <p:cNvPr id="1" name=""/>
+        <p:cNvGrpSpPr/>
+        <p:nvPr/>
+      </p:nvGrpSpPr>
+      <p:grpSpPr>
+        <a:xfrm>
+          <a:off x="0" y="0"/>
+          <a:ext cx="0" cy="0"/>
+          <a:chOff x="0" y="0"/>
+          <a:chExt cx="0" cy="0"/>
+        </a:xfrm>
+      </p:grpSpPr>
+      <p:sp>
+        <p:nvSpPr>
+          <p:cNvPr id="2" name="Title 1">
+            <a:extLst>
+              <a:ext uri="{FF2B5EF4-FFF2-40B4-BE49-F238E27FC236}">
+                <a16:creationId xmlns:a16="http://schemas.microsoft.com/office/drawing/2014/main" id="{EAB4C2F3-4F70-4283-9A80-4338A0A2701D}"/>
+              </a:ext>
+            </a:extLst>
+          </p:cNvPr>
+          <p:cNvSpPr>
+            <a:spLocks noGrp="1"/>
+          </p:cNvSpPr>
+          <p:nvPr>
+            <p:ph type="title"/>
+          </p:nvPr>
+        </p:nvSpPr>
+        <p:spPr/>
+        <p:txBody>
+          <a:bodyPr/>
+          <a:lstStyle/>
+          <a:p>
+            <a:r>
+              <a:rPr lang="en-US" b="1" dirty="0"/>
+              <a:t>Optimal wavelengths to collect</a:t>
+            </a:r>
+          </a:p>
+        </p:txBody>
+      </p:sp>
+      <p:sp>
+        <p:nvSpPr>
+          <p:cNvPr id="3" name="Content Placeholder 2">
+            <a:extLst>
+              <a:ext uri="{FF2B5EF4-FFF2-40B4-BE49-F238E27FC236}">
+                <a16:creationId xmlns:a16="http://schemas.microsoft.com/office/drawing/2014/main" id="{7E7EA47C-BB5D-4E88-AB59-70CAA858D8B0}"/>
+              </a:ext>
+            </a:extLst>
+          </p:cNvPr>
+          <p:cNvSpPr>
+            <a:spLocks noGrp="1"/>
+          </p:cNvSpPr>
+          <p:nvPr>
+            <p:ph idx="1"/>
+          </p:nvPr>
+        </p:nvSpPr>
+        <p:spPr>
+          <a:xfrm>
+            <a:off x="838200" y="1497107"/>
+            <a:ext cx="10515600" cy="4995768"/>
+          </a:xfrm>
+        </p:spPr>
+        <p:txBody>
+          <a:bodyPr>
+            <a:normAutofit/>
+          </a:bodyPr>
+          <a:lstStyle/>
+          <a:p>
+            <a:pPr marL="0" indent="0">
+              <a:buNone/>
+            </a:pPr>
+            <a:endParaRPr lang="en-US" dirty="0"/>
+          </a:p>
+        </p:txBody>
+      </p:sp>
+    </p:spTree>
+    <p:extLst>
+      <p:ext uri="{BB962C8B-B14F-4D97-AF65-F5344CB8AC3E}">
+        <p14:creationId xmlns:p14="http://schemas.microsoft.com/office/powerpoint/2010/main" val="235498645"/>
+      </p:ext>
+    </p:extLst>
+  </p:cSld>
+  <p:clrMapOvr>
+    <a:masterClrMapping/>
+  </p:clrMapOvr>
+</p:sld>
+</file>
+
 <file path=ppt/slides/slide2.xml><?xml version="1.0" encoding="utf-8"?>
 <p:sld xmlns:a="http://schemas.openxmlformats.org/drawingml/2006/main" xmlns:r="http://schemas.openxmlformats.org/officeDocument/2006/relationships" xmlns:p="http://schemas.openxmlformats.org/presentationml/2006/main">
   <p:cSld>
@@ -3635,7 +3732,7 @@
             </a:r>
             <a:r>
               <a:rPr lang="en-US" dirty="0"/>
-              <a:t>: determine the optimal frequency components when acquiring an MSOT spectrum</a:t>
+              <a:t>: determine the optimal wavelength components when acquiring an MSOT spectrum</a:t>
             </a:r>
           </a:p>
           <a:p>
@@ -3655,7 +3752,7 @@
             </a:pPr>
             <a:r>
               <a:rPr lang="en-US" dirty="0"/>
-              <a:t>If we only have time to acquire 6 images (i.e., 6 frequencies), what frequencies will give the most accurate Hb, O2, and ICG measurements?</a:t>
+              <a:t>If we only have time to acquire 6 images (i.e., 6 wavelengths), what wavelengths will give the most accurate Hb, O2, and ICG measurements?</a:t>
             </a:r>
           </a:p>
           <a:p>
@@ -4474,7 +4571,7 @@
         <p:spPr>
           <a:xfrm>
             <a:off x="564779" y="4320986"/>
-            <a:ext cx="2061882" cy="584775"/>
+            <a:ext cx="2099422" cy="584775"/>
           </a:xfrm>
           <a:prstGeom prst="rect">
             <a:avLst/>
@@ -4490,7 +4587,7 @@
             <a:pPr algn="ctr"/>
             <a:r>
               <a:rPr lang="en-US" sz="1600" dirty="0"/>
-              <a:t>experimental MSOT signal at n frequencies</a:t>
+              <a:t>experimental MSOT signal at n wavelengths</a:t>
             </a:r>
           </a:p>
         </p:txBody>
@@ -4649,7 +4746,7 @@
             <a:pPr algn="ctr"/>
             <a:r>
               <a:rPr lang="en-US" sz="1600" dirty="0"/>
-              <a:t>known 100% Hb MSOT signal at n frequencies</a:t>
+              <a:t>known 100% Hb MSOT signal at n wavelengths</a:t>
             </a:r>
           </a:p>
         </p:txBody>
@@ -4685,7 +4782,7 @@
             <a:pPr algn="ctr"/>
             <a:r>
               <a:rPr lang="en-US" sz="1600" dirty="0"/>
-              <a:t>known 100% O2 MSOT signal at n frequencies</a:t>
+              <a:t>known 100% O2 MSOT signal at n wavelengths</a:t>
             </a:r>
           </a:p>
         </p:txBody>
@@ -4721,7 +4818,7 @@
             <a:pPr algn="ctr"/>
             <a:r>
               <a:rPr lang="en-US" sz="1600" dirty="0"/>
-              <a:t>known 100% ICG MSOT signal at n frequencies</a:t>
+              <a:t>known 100% ICG MSOT signal at n wavelengths</a:t>
             </a:r>
           </a:p>
         </p:txBody>
@@ -5346,19 +5443,19 @@
         </p:nvSpPr>
         <p:spPr>
           <a:xfrm>
-            <a:off x="838200" y="69288"/>
-            <a:ext cx="10515600" cy="1325563"/>
+            <a:off x="838200" y="69289"/>
+            <a:ext cx="8054788" cy="1042336"/>
           </a:xfrm>
         </p:spPr>
         <p:txBody>
           <a:bodyPr>
-            <a:normAutofit/>
+            <a:normAutofit fontScale="90000"/>
           </a:bodyPr>
           <a:lstStyle/>
           <a:p>
             <a:r>
               <a:rPr lang="en-US" sz="4000" b="1" dirty="0"/>
-              <a:t>Studied possible machine learning alternative</a:t>
+              <a:t>Developed machine learning alternative</a:t>
             </a:r>
           </a:p>
         </p:txBody>
@@ -5378,7 +5475,7 @@
           <p:nvPr>
             <p:extLst>
               <p:ext uri="{D42A27DB-BD31-4B8C-83A1-F6EECF244321}">
-                <p14:modId xmlns:p14="http://schemas.microsoft.com/office/powerpoint/2010/main" val="3983769533"/>
+                <p14:modId xmlns:p14="http://schemas.microsoft.com/office/powerpoint/2010/main" val="3502107701"/>
               </p:ext>
             </p:extLst>
           </p:nvPr>
@@ -5580,22 +5677,40 @@
                     <a:bodyPr/>
                     <a:lstStyle/>
                     <a:p>
-                      <a:pPr algn="ctr"/>
-                      <a:endParaRPr lang="en-US" dirty="0"/>
+                      <a:pPr algn="ctr" fontAlgn="b"/>
+                      <a:r>
+                        <a:rPr lang="en-US" sz="1800" b="0" i="0" u="none" strike="noStrike" dirty="0">
+                          <a:solidFill>
+                            <a:srgbClr val="000000"/>
+                          </a:solidFill>
+                          <a:effectLst/>
+                          <a:latin typeface="Calibri" panose="020F0502020204030204" pitchFamily="34" charset="0"/>
+                        </a:rPr>
+                        <a:t>0.38</a:t>
+                      </a:r>
                     </a:p>
                   </a:txBody>
-                  <a:tcPr/>
+                  <a:tcPr marL="7620" marR="7620" marT="7620" marB="0" anchor="b"/>
                 </a:tc>
                 <a:tc>
                   <a:txBody>
                     <a:bodyPr/>
                     <a:lstStyle/>
                     <a:p>
-                      <a:pPr algn="ctr"/>
-                      <a:endParaRPr lang="en-US" dirty="0"/>
+                      <a:pPr algn="ctr" fontAlgn="b"/>
+                      <a:r>
+                        <a:rPr lang="en-US" sz="1800" b="0" i="0" u="none" strike="noStrike">
+                          <a:solidFill>
+                            <a:srgbClr val="000000"/>
+                          </a:solidFill>
+                          <a:effectLst/>
+                          <a:latin typeface="Calibri" panose="020F0502020204030204" pitchFamily="34" charset="0"/>
+                        </a:rPr>
+                        <a:t>0.67</a:t>
+                      </a:r>
                     </a:p>
                   </a:txBody>
-                  <a:tcPr/>
+                  <a:tcPr marL="7620" marR="7620" marT="7620" marB="0" anchor="b"/>
                 </a:tc>
                 <a:extLst>
                   <a:ext uri="{0D108BD9-81ED-4DB2-BD59-A6C34878D82A}">
@@ -5651,22 +5766,40 @@
                     <a:bodyPr/>
                     <a:lstStyle/>
                     <a:p>
-                      <a:pPr algn="ctr"/>
-                      <a:endParaRPr lang="en-US" dirty="0"/>
+                      <a:pPr algn="ctr" fontAlgn="b"/>
+                      <a:r>
+                        <a:rPr lang="en-US" sz="1800" b="0" i="0" u="none" strike="noStrike" dirty="0">
+                          <a:solidFill>
+                            <a:srgbClr val="000000"/>
+                          </a:solidFill>
+                          <a:effectLst/>
+                          <a:latin typeface="Calibri" panose="020F0502020204030204" pitchFamily="34" charset="0"/>
+                        </a:rPr>
+                        <a:t>0.22</a:t>
+                      </a:r>
                     </a:p>
                   </a:txBody>
-                  <a:tcPr/>
+                  <a:tcPr marL="7620" marR="7620" marT="7620" marB="0" anchor="b"/>
                 </a:tc>
                 <a:tc>
                   <a:txBody>
                     <a:bodyPr/>
                     <a:lstStyle/>
                     <a:p>
-                      <a:pPr algn="ctr"/>
-                      <a:endParaRPr lang="en-US" dirty="0"/>
+                      <a:pPr algn="ctr" fontAlgn="b"/>
+                      <a:r>
+                        <a:rPr lang="en-US" sz="1800" b="0" i="0" u="none" strike="noStrike" dirty="0">
+                          <a:solidFill>
+                            <a:srgbClr val="000000"/>
+                          </a:solidFill>
+                          <a:effectLst/>
+                          <a:latin typeface="Calibri" panose="020F0502020204030204" pitchFamily="34" charset="0"/>
+                        </a:rPr>
+                        <a:t>0.89</a:t>
+                      </a:r>
                     </a:p>
                   </a:txBody>
-                  <a:tcPr/>
+                  <a:tcPr marL="7620" marR="7620" marT="7620" marB="0" anchor="b"/>
                 </a:tc>
                 <a:extLst>
                   <a:ext uri="{0D108BD9-81ED-4DB2-BD59-A6C34878D82A}">
@@ -5722,22 +5855,40 @@
                     <a:bodyPr/>
                     <a:lstStyle/>
                     <a:p>
-                      <a:pPr algn="ctr"/>
-                      <a:endParaRPr lang="en-US" dirty="0"/>
+                      <a:pPr algn="ctr" fontAlgn="b"/>
+                      <a:r>
+                        <a:rPr lang="en-US" sz="1800" b="0" i="0" u="none" strike="noStrike">
+                          <a:solidFill>
+                            <a:srgbClr val="000000"/>
+                          </a:solidFill>
+                          <a:effectLst/>
+                          <a:latin typeface="Calibri" panose="020F0502020204030204" pitchFamily="34" charset="0"/>
+                        </a:rPr>
+                        <a:t>0.01</a:t>
+                      </a:r>
                     </a:p>
                   </a:txBody>
-                  <a:tcPr/>
+                  <a:tcPr marL="7620" marR="7620" marT="7620" marB="0" anchor="b"/>
                 </a:tc>
                 <a:tc>
                   <a:txBody>
                     <a:bodyPr/>
                     <a:lstStyle/>
                     <a:p>
-                      <a:pPr algn="ctr"/>
-                      <a:endParaRPr lang="en-US" dirty="0"/>
+                      <a:pPr algn="ctr" fontAlgn="b"/>
+                      <a:r>
+                        <a:rPr lang="en-US" sz="1800" b="0" i="0" u="none" strike="noStrike" dirty="0">
+                          <a:solidFill>
+                            <a:srgbClr val="000000"/>
+                          </a:solidFill>
+                          <a:effectLst/>
+                          <a:latin typeface="Calibri" panose="020F0502020204030204" pitchFamily="34" charset="0"/>
+                        </a:rPr>
+                        <a:t>0.96</a:t>
+                      </a:r>
                     </a:p>
                   </a:txBody>
-                  <a:tcPr/>
+                  <a:tcPr marL="7620" marR="7620" marT="7620" marB="0" anchor="b"/>
                 </a:tc>
                 <a:extLst>
                   <a:ext uri="{0D108BD9-81ED-4DB2-BD59-A6C34878D82A}">
@@ -5793,22 +5944,40 @@
                     <a:bodyPr/>
                     <a:lstStyle/>
                     <a:p>
-                      <a:pPr algn="ctr"/>
-                      <a:endParaRPr lang="en-US" dirty="0"/>
+                      <a:pPr algn="ctr" fontAlgn="b"/>
+                      <a:r>
+                        <a:rPr lang="en-US" sz="1800" b="0" i="0" u="none" strike="noStrike">
+                          <a:solidFill>
+                            <a:srgbClr val="000000"/>
+                          </a:solidFill>
+                          <a:effectLst/>
+                          <a:latin typeface="Calibri" panose="020F0502020204030204" pitchFamily="34" charset="0"/>
+                        </a:rPr>
+                        <a:t>0.57</a:t>
+                      </a:r>
                     </a:p>
                   </a:txBody>
-                  <a:tcPr/>
+                  <a:tcPr marL="7620" marR="7620" marT="7620" marB="0" anchor="b"/>
                 </a:tc>
                 <a:tc>
                   <a:txBody>
                     <a:bodyPr/>
                     <a:lstStyle/>
                     <a:p>
-                      <a:pPr algn="ctr"/>
-                      <a:endParaRPr lang="en-US" dirty="0"/>
+                      <a:pPr algn="ctr" fontAlgn="b"/>
+                      <a:r>
+                        <a:rPr lang="en-US" sz="1800" b="0" i="0" u="none" strike="noStrike" dirty="0">
+                          <a:solidFill>
+                            <a:srgbClr val="000000"/>
+                          </a:solidFill>
+                          <a:effectLst/>
+                          <a:latin typeface="Calibri" panose="020F0502020204030204" pitchFamily="34" charset="0"/>
+                        </a:rPr>
+                        <a:t>0.37</a:t>
+                      </a:r>
                     </a:p>
                   </a:txBody>
-                  <a:tcPr/>
+                  <a:tcPr marL="7620" marR="7620" marT="7620" marB="0" anchor="b"/>
                 </a:tc>
                 <a:extLst>
                   <a:ext uri="{0D108BD9-81ED-4DB2-BD59-A6C34878D82A}">
@@ -5864,22 +6033,40 @@
                     <a:bodyPr/>
                     <a:lstStyle/>
                     <a:p>
-                      <a:pPr algn="ctr"/>
-                      <a:endParaRPr lang="en-US" dirty="0"/>
+                      <a:pPr algn="ctr" fontAlgn="b"/>
+                      <a:r>
+                        <a:rPr lang="en-US" sz="1800" b="0" i="0" u="none" strike="noStrike">
+                          <a:solidFill>
+                            <a:srgbClr val="000000"/>
+                          </a:solidFill>
+                          <a:effectLst/>
+                          <a:latin typeface="Calibri" panose="020F0502020204030204" pitchFamily="34" charset="0"/>
+                        </a:rPr>
+                        <a:t>0.82</a:t>
+                      </a:r>
                     </a:p>
                   </a:txBody>
-                  <a:tcPr/>
+                  <a:tcPr marL="7620" marR="7620" marT="7620" marB="0" anchor="b"/>
                 </a:tc>
                 <a:tc>
                   <a:txBody>
                     <a:bodyPr/>
                     <a:lstStyle/>
                     <a:p>
-                      <a:pPr algn="ctr"/>
-                      <a:endParaRPr lang="en-US" dirty="0"/>
+                      <a:pPr algn="ctr" fontAlgn="b"/>
+                      <a:r>
+                        <a:rPr lang="en-US" sz="1800" b="0" i="0" u="none" strike="noStrike" dirty="0">
+                          <a:solidFill>
+                            <a:srgbClr val="000000"/>
+                          </a:solidFill>
+                          <a:effectLst/>
+                          <a:latin typeface="Calibri" panose="020F0502020204030204" pitchFamily="34" charset="0"/>
+                        </a:rPr>
+                        <a:t>0.85</a:t>
+                      </a:r>
                     </a:p>
                   </a:txBody>
-                  <a:tcPr/>
+                  <a:tcPr marL="7620" marR="7620" marT="7620" marB="0" anchor="b"/>
                 </a:tc>
                 <a:extLst>
                   <a:ext uri="{0D108BD9-81ED-4DB2-BD59-A6C34878D82A}">
@@ -5935,22 +6122,40 @@
                     <a:bodyPr/>
                     <a:lstStyle/>
                     <a:p>
-                      <a:pPr algn="ctr"/>
-                      <a:endParaRPr lang="en-US" dirty="0"/>
+                      <a:pPr algn="ctr" fontAlgn="b"/>
+                      <a:r>
+                        <a:rPr lang="en-US" sz="1800" b="0" i="0" u="none" strike="noStrike">
+                          <a:solidFill>
+                            <a:srgbClr val="000000"/>
+                          </a:solidFill>
+                          <a:effectLst/>
+                          <a:latin typeface="Calibri" panose="020F0502020204030204" pitchFamily="34" charset="0"/>
+                        </a:rPr>
+                        <a:t>0.86</a:t>
+                      </a:r>
                     </a:p>
                   </a:txBody>
-                  <a:tcPr/>
+                  <a:tcPr marL="7620" marR="7620" marT="7620" marB="0" anchor="b"/>
                 </a:tc>
                 <a:tc>
                   <a:txBody>
                     <a:bodyPr/>
                     <a:lstStyle/>
                     <a:p>
-                      <a:pPr algn="ctr"/>
-                      <a:endParaRPr lang="en-US" dirty="0"/>
+                      <a:pPr algn="ctr" fontAlgn="b"/>
+                      <a:r>
+                        <a:rPr lang="en-US" sz="1800" b="0" i="0" u="none" strike="noStrike" dirty="0">
+                          <a:solidFill>
+                            <a:srgbClr val="000000"/>
+                          </a:solidFill>
+                          <a:effectLst/>
+                          <a:latin typeface="Calibri" panose="020F0502020204030204" pitchFamily="34" charset="0"/>
+                        </a:rPr>
+                        <a:t>0.93</a:t>
+                      </a:r>
                     </a:p>
                   </a:txBody>
-                  <a:tcPr/>
+                  <a:tcPr marL="7620" marR="7620" marT="7620" marB="0" anchor="b"/>
                 </a:tc>
                 <a:extLst>
                   <a:ext uri="{0D108BD9-81ED-4DB2-BD59-A6C34878D82A}">
@@ -6011,7 +6216,7 @@
         </p:nvSpPr>
         <p:spPr>
           <a:xfrm rot="16200000">
-            <a:off x="7381123" y="2450702"/>
+            <a:off x="7381123" y="2881011"/>
             <a:ext cx="475129" cy="523220"/>
           </a:xfrm>
           <a:prstGeom prst="rect">
@@ -6047,7 +6252,7 @@
           <p:nvPr>
             <p:extLst>
               <p:ext uri="{D42A27DB-BD31-4B8C-83A1-F6EECF244321}">
-                <p14:modId xmlns:p14="http://schemas.microsoft.com/office/powerpoint/2010/main" val="1292153395"/>
+                <p14:modId xmlns:p14="http://schemas.microsoft.com/office/powerpoint/2010/main" val="2857261043"/>
               </p:ext>
             </p:extLst>
           </p:nvPr>
@@ -6080,7 +6285,7 @@
                       <a:pPr algn="ctr"/>
                       <a:r>
                         <a:rPr lang="en-US" dirty="0" err="1"/>
-                        <a:t>Xn</a:t>
+                        <a:t>Xp</a:t>
                       </a:r>
                       <a:endParaRPr lang="en-US" dirty="0"/>
                     </a:p>
@@ -6099,11 +6304,20 @@
                     <a:bodyPr/>
                     <a:lstStyle/>
                     <a:p>
-                      <a:pPr algn="ctr"/>
-                      <a:endParaRPr lang="en-US" dirty="0"/>
+                      <a:pPr algn="ctr" fontAlgn="b"/>
+                      <a:r>
+                        <a:rPr lang="en-US" sz="1800" b="0" i="0" u="none" strike="noStrike" dirty="0">
+                          <a:solidFill>
+                            <a:srgbClr val="000000"/>
+                          </a:solidFill>
+                          <a:effectLst/>
+                          <a:latin typeface="Calibri" panose="020F0502020204030204" pitchFamily="34" charset="0"/>
+                        </a:rPr>
+                        <a:t>0.45</a:t>
+                      </a:r>
                     </a:p>
                   </a:txBody>
-                  <a:tcPr/>
+                  <a:tcPr marL="7620" marR="7620" marT="7620" marB="0" anchor="b"/>
                 </a:tc>
                 <a:extLst>
                   <a:ext uri="{0D108BD9-81ED-4DB2-BD59-A6C34878D82A}">
@@ -6117,11 +6331,20 @@
                     <a:bodyPr/>
                     <a:lstStyle/>
                     <a:p>
-                      <a:pPr algn="ctr"/>
-                      <a:endParaRPr lang="en-US" dirty="0"/>
+                      <a:pPr algn="ctr" fontAlgn="b"/>
+                      <a:r>
+                        <a:rPr lang="en-US" sz="1800" b="0" i="0" u="none" strike="noStrike">
+                          <a:solidFill>
+                            <a:srgbClr val="000000"/>
+                          </a:solidFill>
+                          <a:effectLst/>
+                          <a:latin typeface="Calibri" panose="020F0502020204030204" pitchFamily="34" charset="0"/>
+                        </a:rPr>
+                        <a:t>1.00</a:t>
+                      </a:r>
                     </a:p>
                   </a:txBody>
-                  <a:tcPr/>
+                  <a:tcPr marL="7620" marR="7620" marT="7620" marB="0" anchor="b"/>
                 </a:tc>
                 <a:extLst>
                   <a:ext uri="{0D108BD9-81ED-4DB2-BD59-A6C34878D82A}">
@@ -6135,11 +6358,20 @@
                     <a:bodyPr/>
                     <a:lstStyle/>
                     <a:p>
-                      <a:pPr algn="ctr"/>
-                      <a:endParaRPr lang="en-US" dirty="0"/>
+                      <a:pPr algn="ctr" fontAlgn="b"/>
+                      <a:r>
+                        <a:rPr lang="en-US" sz="1800" b="0" i="0" u="none" strike="noStrike">
+                          <a:solidFill>
+                            <a:srgbClr val="000000"/>
+                          </a:solidFill>
+                          <a:effectLst/>
+                          <a:latin typeface="Calibri" panose="020F0502020204030204" pitchFamily="34" charset="0"/>
+                        </a:rPr>
+                        <a:t>0.47</a:t>
+                      </a:r>
                     </a:p>
                   </a:txBody>
-                  <a:tcPr/>
+                  <a:tcPr marL="7620" marR="7620" marT="7620" marB="0" anchor="b"/>
                 </a:tc>
                 <a:extLst>
                   <a:ext uri="{0D108BD9-81ED-4DB2-BD59-A6C34878D82A}">
@@ -6153,11 +6385,20 @@
                     <a:bodyPr/>
                     <a:lstStyle/>
                     <a:p>
-                      <a:pPr algn="ctr"/>
-                      <a:endParaRPr lang="en-US" dirty="0"/>
+                      <a:pPr algn="ctr" fontAlgn="b"/>
+                      <a:r>
+                        <a:rPr lang="en-US" sz="1800" b="0" i="0" u="none" strike="noStrike">
+                          <a:solidFill>
+                            <a:srgbClr val="000000"/>
+                          </a:solidFill>
+                          <a:effectLst/>
+                          <a:latin typeface="Calibri" panose="020F0502020204030204" pitchFamily="34" charset="0"/>
+                        </a:rPr>
+                        <a:t>0.66</a:t>
+                      </a:r>
                     </a:p>
                   </a:txBody>
-                  <a:tcPr/>
+                  <a:tcPr marL="7620" marR="7620" marT="7620" marB="0" anchor="b"/>
                 </a:tc>
                 <a:extLst>
                   <a:ext uri="{0D108BD9-81ED-4DB2-BD59-A6C34878D82A}">
@@ -6171,11 +6412,20 @@
                     <a:bodyPr/>
                     <a:lstStyle/>
                     <a:p>
-                      <a:pPr algn="ctr"/>
-                      <a:endParaRPr lang="en-US" dirty="0"/>
+                      <a:pPr algn="ctr" fontAlgn="b"/>
+                      <a:r>
+                        <a:rPr lang="en-US" sz="1800" b="0" i="0" u="none" strike="noStrike">
+                          <a:solidFill>
+                            <a:srgbClr val="000000"/>
+                          </a:solidFill>
+                          <a:effectLst/>
+                          <a:latin typeface="Calibri" panose="020F0502020204030204" pitchFamily="34" charset="0"/>
+                        </a:rPr>
+                        <a:t>0.28</a:t>
+                      </a:r>
                     </a:p>
                   </a:txBody>
-                  <a:tcPr/>
+                  <a:tcPr marL="7620" marR="7620" marT="7620" marB="0" anchor="b"/>
                 </a:tc>
                 <a:extLst>
                   <a:ext uri="{0D108BD9-81ED-4DB2-BD59-A6C34878D82A}">
@@ -6189,11 +6439,20 @@
                     <a:bodyPr/>
                     <a:lstStyle/>
                     <a:p>
-                      <a:pPr algn="ctr"/>
-                      <a:endParaRPr lang="en-US" dirty="0"/>
+                      <a:pPr algn="ctr" fontAlgn="b"/>
+                      <a:r>
+                        <a:rPr lang="en-US" sz="1800" b="0" i="0" u="none" strike="noStrike" dirty="0">
+                          <a:solidFill>
+                            <a:srgbClr val="000000"/>
+                          </a:solidFill>
+                          <a:effectLst/>
+                          <a:latin typeface="Calibri" panose="020F0502020204030204" pitchFamily="34" charset="0"/>
+                        </a:rPr>
+                        <a:t>0.93</a:t>
+                      </a:r>
                     </a:p>
                   </a:txBody>
-                  <a:tcPr/>
+                  <a:tcPr marL="7620" marR="7620" marT="7620" marB="0" anchor="b"/>
                 </a:tc>
                 <a:extLst>
                   <a:ext uri="{0D108BD9-81ED-4DB2-BD59-A6C34878D82A}">
@@ -6220,13 +6479,13 @@
           <p:nvPr>
             <p:extLst>
               <p:ext uri="{D42A27DB-BD31-4B8C-83A1-F6EECF244321}">
-                <p14:modId xmlns:p14="http://schemas.microsoft.com/office/powerpoint/2010/main" val="1981599546"/>
+                <p14:modId xmlns:p14="http://schemas.microsoft.com/office/powerpoint/2010/main" val="801692866"/>
               </p:ext>
             </p:extLst>
           </p:nvPr>
         </p:nvGraphicFramePr>
         <p:xfrm>
-          <a:off x="147913" y="4479165"/>
+          <a:off x="147913" y="4532955"/>
           <a:ext cx="7209165" cy="365760"/>
         </p:xfrm>
         <a:graphic>
@@ -6285,7 +6544,32 @@
                             <a:schemeClr val="tx1"/>
                           </a:solidFill>
                         </a:rPr>
-                        <a:t>1</a:t>
+                        <a:t>0</a:t>
+                      </a:r>
+                    </a:p>
+                  </a:txBody>
+                  <a:tcPr>
+                    <a:solidFill>
+                      <a:schemeClr val="accent1">
+                        <a:lumMod val="20000"/>
+                        <a:lumOff val="80000"/>
+                      </a:schemeClr>
+                    </a:solidFill>
+                  </a:tcPr>
+                </a:tc>
+                <a:tc>
+                  <a:txBody>
+                    <a:bodyPr/>
+                    <a:lstStyle/>
+                    <a:p>
+                      <a:pPr algn="ctr"/>
+                      <a:r>
+                        <a:rPr lang="en-US" b="0" dirty="0">
+                          <a:solidFill>
+                            <a:schemeClr val="tx1"/>
+                          </a:solidFill>
+                        </a:rPr>
+                        <a:t>0</a:t>
                       </a:r>
                     </a:p>
                   </a:txBody>
@@ -6335,7 +6619,7 @@
                             <a:schemeClr val="tx1"/>
                           </a:solidFill>
                         </a:rPr>
-                        <a:t>1</a:t>
+                        <a:t>0.34</a:t>
                       </a:r>
                     </a:p>
                   </a:txBody>
@@ -6360,30 +6644,8 @@
                             <a:schemeClr val="tx1"/>
                           </a:solidFill>
                         </a:rPr>
-                        <a:t>1</a:t>
+                        <a:t>0.29</a:t>
                       </a:r>
-                    </a:p>
-                  </a:txBody>
-                  <a:tcPr>
-                    <a:solidFill>
-                      <a:schemeClr val="accent1">
-                        <a:lumMod val="20000"/>
-                        <a:lumOff val="80000"/>
-                      </a:schemeClr>
-                    </a:solidFill>
-                  </a:tcPr>
-                </a:tc>
-                <a:tc>
-                  <a:txBody>
-                    <a:bodyPr/>
-                    <a:lstStyle/>
-                    <a:p>
-                      <a:pPr algn="ctr"/>
-                      <a:endParaRPr lang="en-US" b="0" dirty="0">
-                        <a:solidFill>
-                          <a:schemeClr val="tx1"/>
-                        </a:solidFill>
-                      </a:endParaRPr>
                     </a:p>
                   </a:txBody>
                   <a:tcPr>
@@ -6405,10 +6667,1097 @@
           </a:graphicData>
         </a:graphic>
       </p:graphicFrame>
+      <p:graphicFrame>
+        <p:nvGraphicFramePr>
+          <p:cNvPr id="8" name="Table 6">
+            <a:extLst>
+              <a:ext uri="{FF2B5EF4-FFF2-40B4-BE49-F238E27FC236}">
+                <a16:creationId xmlns:a16="http://schemas.microsoft.com/office/drawing/2014/main" id="{0ED3D2D0-4D5F-4A0C-BE37-F378AA27DB24}"/>
+              </a:ext>
+            </a:extLst>
+          </p:cNvPr>
+          <p:cNvGraphicFramePr>
+            <a:graphicFrameLocks noGrp="1"/>
+          </p:cNvGraphicFramePr>
+          <p:nvPr>
+            <p:extLst>
+              <p:ext uri="{D42A27DB-BD31-4B8C-83A1-F6EECF244321}">
+                <p14:modId xmlns:p14="http://schemas.microsoft.com/office/powerpoint/2010/main" val="3882147545"/>
+              </p:ext>
+            </p:extLst>
+          </p:nvPr>
+        </p:nvGraphicFramePr>
+        <p:xfrm>
+          <a:off x="7989624" y="4532955"/>
+          <a:ext cx="1446494" cy="365760"/>
+        </p:xfrm>
+        <a:graphic>
+          <a:graphicData uri="http://schemas.openxmlformats.org/drawingml/2006/table">
+            <a:tbl>
+              <a:tblPr firstRow="1" bandRow="1">
+                <a:tableStyleId>{5C22544A-7EE6-4342-B048-85BDC9FD1C3A}</a:tableStyleId>
+              </a:tblPr>
+              <a:tblGrid>
+                <a:gridCol w="1446494">
+                  <a:extLst>
+                    <a:ext uri="{9D8B030D-6E8A-4147-A177-3AD203B41FA5}">
+                      <a16:colId xmlns:a16="http://schemas.microsoft.com/office/drawing/2014/main" val="2760810114"/>
+                    </a:ext>
+                  </a:extLst>
+                </a:gridCol>
+              </a:tblGrid>
+              <a:tr h="345922">
+                <a:tc>
+                  <a:txBody>
+                    <a:bodyPr/>
+                    <a:lstStyle/>
+                    <a:p>
+                      <a:pPr algn="ctr"/>
+                      <a:r>
+                        <a:rPr lang="en-US" b="0" dirty="0">
+                          <a:solidFill>
+                            <a:schemeClr val="tx1"/>
+                          </a:solidFill>
+                        </a:rPr>
+                        <a:t>0.16</a:t>
+                      </a:r>
+                    </a:p>
+                  </a:txBody>
+                  <a:tcPr>
+                    <a:solidFill>
+                      <a:schemeClr val="accent1">
+                        <a:lumMod val="20000"/>
+                        <a:lumOff val="80000"/>
+                      </a:schemeClr>
+                    </a:solidFill>
+                  </a:tcPr>
+                </a:tc>
+                <a:extLst>
+                  <a:ext uri="{0D108BD9-81ED-4DB2-BD59-A6C34878D82A}">
+                    <a16:rowId xmlns:a16="http://schemas.microsoft.com/office/drawing/2014/main" val="1021223636"/>
+                  </a:ext>
+                </a:extLst>
+              </a:tr>
+            </a:tbl>
+          </a:graphicData>
+        </a:graphic>
+      </p:graphicFrame>
+      <p:sp>
+        <p:nvSpPr>
+          <p:cNvPr id="10" name="TextBox 9">
+            <a:extLst>
+              <a:ext uri="{FF2B5EF4-FFF2-40B4-BE49-F238E27FC236}">
+                <a16:creationId xmlns:a16="http://schemas.microsoft.com/office/drawing/2014/main" id="{7F9C687C-0A9E-4512-A68F-2BB9647F369F}"/>
+              </a:ext>
+            </a:extLst>
+          </p:cNvPr>
+          <p:cNvSpPr txBox="1"/>
+          <p:nvPr/>
+        </p:nvSpPr>
+        <p:spPr>
+          <a:xfrm>
+            <a:off x="4513728" y="4028153"/>
+            <a:ext cx="475129" cy="523220"/>
+          </a:xfrm>
+          <a:prstGeom prst="rect">
+            <a:avLst/>
+          </a:prstGeom>
+          <a:noFill/>
+        </p:spPr>
+        <p:txBody>
+          <a:bodyPr wrap="square" rtlCol="0">
+            <a:spAutoFit/>
+          </a:bodyPr>
+          <a:lstStyle/>
+          <a:p>
+            <a:r>
+              <a:rPr lang="en-US" sz="2800" dirty="0"/>
+              <a:t>…</a:t>
+            </a:r>
+          </a:p>
+        </p:txBody>
+      </p:sp>
+      <p:cxnSp>
+        <p:nvCxnSpPr>
+          <p:cNvPr id="4" name="Straight Arrow Connector 3">
+            <a:extLst>
+              <a:ext uri="{FF2B5EF4-FFF2-40B4-BE49-F238E27FC236}">
+                <a16:creationId xmlns:a16="http://schemas.microsoft.com/office/drawing/2014/main" id="{B392D3DF-6184-45E8-819D-98BADAE85224}"/>
+              </a:ext>
+            </a:extLst>
+          </p:cNvPr>
+          <p:cNvCxnSpPr/>
+          <p:nvPr/>
+        </p:nvCxnSpPr>
+        <p:spPr>
+          <a:xfrm>
+            <a:off x="8892988" y="1506071"/>
+            <a:ext cx="941294" cy="0"/>
+          </a:xfrm>
+          <a:prstGeom prst="straightConnector1">
+            <a:avLst/>
+          </a:prstGeom>
+          <a:ln>
+            <a:tailEnd type="triangle"/>
+          </a:ln>
+        </p:spPr>
+        <p:style>
+          <a:lnRef idx="1">
+            <a:schemeClr val="dk1"/>
+          </a:lnRef>
+          <a:fillRef idx="0">
+            <a:schemeClr val="dk1"/>
+          </a:fillRef>
+          <a:effectRef idx="0">
+            <a:schemeClr val="dk1"/>
+          </a:effectRef>
+          <a:fontRef idx="minor">
+            <a:schemeClr val="tx1"/>
+          </a:fontRef>
+        </p:style>
+      </p:cxnSp>
+      <p:sp>
+        <p:nvSpPr>
+          <p:cNvPr id="12" name="TextBox 11">
+            <a:extLst>
+              <a:ext uri="{FF2B5EF4-FFF2-40B4-BE49-F238E27FC236}">
+                <a16:creationId xmlns:a16="http://schemas.microsoft.com/office/drawing/2014/main" id="{24449C77-7750-4BD9-AD50-F2F7250D212B}"/>
+              </a:ext>
+            </a:extLst>
+          </p:cNvPr>
+          <p:cNvSpPr txBox="1"/>
+          <p:nvPr/>
+        </p:nvSpPr>
+        <p:spPr>
+          <a:xfrm>
+            <a:off x="9730443" y="1213683"/>
+            <a:ext cx="2496666" cy="584775"/>
+          </a:xfrm>
+          <a:prstGeom prst="rect">
+            <a:avLst/>
+          </a:prstGeom>
+          <a:noFill/>
+        </p:spPr>
+        <p:txBody>
+          <a:bodyPr wrap="square" rtlCol="0">
+            <a:spAutoFit/>
+          </a:bodyPr>
+          <a:lstStyle/>
+          <a:p>
+            <a:pPr algn="ctr"/>
+            <a:r>
+              <a:rPr lang="en-US" sz="1600" dirty="0"/>
+              <a:t>p wavelengths, where each wavelength is a predictor.</a:t>
+            </a:r>
+          </a:p>
+        </p:txBody>
+      </p:sp>
+      <p:cxnSp>
+        <p:nvCxnSpPr>
+          <p:cNvPr id="11" name="Straight Connector 10">
+            <a:extLst>
+              <a:ext uri="{FF2B5EF4-FFF2-40B4-BE49-F238E27FC236}">
+                <a16:creationId xmlns:a16="http://schemas.microsoft.com/office/drawing/2014/main" id="{6FF142DE-7A61-4A84-9968-D34325C0B078}"/>
+              </a:ext>
+            </a:extLst>
+          </p:cNvPr>
+          <p:cNvCxnSpPr/>
+          <p:nvPr/>
+        </p:nvCxnSpPr>
+        <p:spPr>
+          <a:xfrm>
+            <a:off x="4778187" y="5029200"/>
+            <a:ext cx="0" cy="286871"/>
+          </a:xfrm>
+          <a:prstGeom prst="line">
+            <a:avLst/>
+          </a:prstGeom>
+          <a:ln>
+            <a:solidFill>
+              <a:schemeClr val="tx1"/>
+            </a:solidFill>
+          </a:ln>
+        </p:spPr>
+        <p:style>
+          <a:lnRef idx="1">
+            <a:schemeClr val="accent1"/>
+          </a:lnRef>
+          <a:fillRef idx="0">
+            <a:schemeClr val="accent1"/>
+          </a:fillRef>
+          <a:effectRef idx="0">
+            <a:schemeClr val="accent1"/>
+          </a:effectRef>
+          <a:fontRef idx="minor">
+            <a:schemeClr val="tx1"/>
+          </a:fontRef>
+        </p:style>
+      </p:cxnSp>
+      <p:cxnSp>
+        <p:nvCxnSpPr>
+          <p:cNvPr id="14" name="Straight Connector 13">
+            <a:extLst>
+              <a:ext uri="{FF2B5EF4-FFF2-40B4-BE49-F238E27FC236}">
+                <a16:creationId xmlns:a16="http://schemas.microsoft.com/office/drawing/2014/main" id="{238CDFA5-7373-4894-9E83-5FF3BEE5F9A7}"/>
+              </a:ext>
+            </a:extLst>
+          </p:cNvPr>
+          <p:cNvCxnSpPr>
+            <a:cxnSpLocks/>
+          </p:cNvCxnSpPr>
+          <p:nvPr/>
+        </p:nvCxnSpPr>
+        <p:spPr>
+          <a:xfrm>
+            <a:off x="4778187" y="5316071"/>
+            <a:ext cx="4616829" cy="0"/>
+          </a:xfrm>
+          <a:prstGeom prst="line">
+            <a:avLst/>
+          </a:prstGeom>
+          <a:ln>
+            <a:solidFill>
+              <a:schemeClr val="tx1"/>
+            </a:solidFill>
+          </a:ln>
+        </p:spPr>
+        <p:style>
+          <a:lnRef idx="1">
+            <a:schemeClr val="accent1"/>
+          </a:lnRef>
+          <a:fillRef idx="0">
+            <a:schemeClr val="accent1"/>
+          </a:fillRef>
+          <a:effectRef idx="0">
+            <a:schemeClr val="accent1"/>
+          </a:effectRef>
+          <a:fontRef idx="minor">
+            <a:schemeClr val="tx1"/>
+          </a:fontRef>
+        </p:style>
+      </p:cxnSp>
+      <p:cxnSp>
+        <p:nvCxnSpPr>
+          <p:cNvPr id="18" name="Straight Connector 17">
+            <a:extLst>
+              <a:ext uri="{FF2B5EF4-FFF2-40B4-BE49-F238E27FC236}">
+                <a16:creationId xmlns:a16="http://schemas.microsoft.com/office/drawing/2014/main" id="{A61FB332-D198-4382-AFEE-9F689B3E6BF4}"/>
+              </a:ext>
+            </a:extLst>
+          </p:cNvPr>
+          <p:cNvCxnSpPr/>
+          <p:nvPr/>
+        </p:nvCxnSpPr>
+        <p:spPr>
+          <a:xfrm>
+            <a:off x="9395016" y="5029199"/>
+            <a:ext cx="0" cy="286871"/>
+          </a:xfrm>
+          <a:prstGeom prst="line">
+            <a:avLst/>
+          </a:prstGeom>
+          <a:ln>
+            <a:solidFill>
+              <a:schemeClr val="tx1"/>
+            </a:solidFill>
+          </a:ln>
+        </p:spPr>
+        <p:style>
+          <a:lnRef idx="1">
+            <a:schemeClr val="accent1"/>
+          </a:lnRef>
+          <a:fillRef idx="0">
+            <a:schemeClr val="accent1"/>
+          </a:fillRef>
+          <a:effectRef idx="0">
+            <a:schemeClr val="accent1"/>
+          </a:effectRef>
+          <a:fontRef idx="minor">
+            <a:schemeClr val="tx1"/>
+          </a:fontRef>
+        </p:style>
+      </p:cxnSp>
+      <p:cxnSp>
+        <p:nvCxnSpPr>
+          <p:cNvPr id="19" name="Straight Connector 18">
+            <a:extLst>
+              <a:ext uri="{FF2B5EF4-FFF2-40B4-BE49-F238E27FC236}">
+                <a16:creationId xmlns:a16="http://schemas.microsoft.com/office/drawing/2014/main" id="{74853B40-10BB-42AB-A634-456C7E0AA7F0}"/>
+              </a:ext>
+            </a:extLst>
+          </p:cNvPr>
+          <p:cNvCxnSpPr>
+            <a:cxnSpLocks/>
+          </p:cNvCxnSpPr>
+          <p:nvPr/>
+        </p:nvCxnSpPr>
+        <p:spPr>
+          <a:xfrm>
+            <a:off x="156876" y="5029200"/>
+            <a:ext cx="0" cy="286871"/>
+          </a:xfrm>
+          <a:prstGeom prst="line">
+            <a:avLst/>
+          </a:prstGeom>
+          <a:ln>
+            <a:solidFill>
+              <a:schemeClr val="tx1"/>
+            </a:solidFill>
+          </a:ln>
+        </p:spPr>
+        <p:style>
+          <a:lnRef idx="1">
+            <a:schemeClr val="accent1"/>
+          </a:lnRef>
+          <a:fillRef idx="0">
+            <a:schemeClr val="accent1"/>
+          </a:fillRef>
+          <a:effectRef idx="0">
+            <a:schemeClr val="accent1"/>
+          </a:effectRef>
+          <a:fontRef idx="minor">
+            <a:schemeClr val="tx1"/>
+          </a:fontRef>
+        </p:style>
+      </p:cxnSp>
+      <p:cxnSp>
+        <p:nvCxnSpPr>
+          <p:cNvPr id="20" name="Straight Connector 19">
+            <a:extLst>
+              <a:ext uri="{FF2B5EF4-FFF2-40B4-BE49-F238E27FC236}">
+                <a16:creationId xmlns:a16="http://schemas.microsoft.com/office/drawing/2014/main" id="{23F346DC-4897-466E-9417-094431B20BF6}"/>
+              </a:ext>
+            </a:extLst>
+          </p:cNvPr>
+          <p:cNvCxnSpPr>
+            <a:cxnSpLocks/>
+          </p:cNvCxnSpPr>
+          <p:nvPr/>
+        </p:nvCxnSpPr>
+        <p:spPr>
+          <a:xfrm>
+            <a:off x="4686300" y="5029198"/>
+            <a:ext cx="0" cy="286871"/>
+          </a:xfrm>
+          <a:prstGeom prst="line">
+            <a:avLst/>
+          </a:prstGeom>
+          <a:ln>
+            <a:solidFill>
+              <a:schemeClr val="tx1"/>
+            </a:solidFill>
+          </a:ln>
+        </p:spPr>
+        <p:style>
+          <a:lnRef idx="1">
+            <a:schemeClr val="accent1"/>
+          </a:lnRef>
+          <a:fillRef idx="0">
+            <a:schemeClr val="accent1"/>
+          </a:fillRef>
+          <a:effectRef idx="0">
+            <a:schemeClr val="accent1"/>
+          </a:effectRef>
+          <a:fontRef idx="minor">
+            <a:schemeClr val="tx1"/>
+          </a:fontRef>
+        </p:style>
+      </p:cxnSp>
+      <p:cxnSp>
+        <p:nvCxnSpPr>
+          <p:cNvPr id="21" name="Straight Connector 20">
+            <a:extLst>
+              <a:ext uri="{FF2B5EF4-FFF2-40B4-BE49-F238E27FC236}">
+                <a16:creationId xmlns:a16="http://schemas.microsoft.com/office/drawing/2014/main" id="{A42C92AE-EC9B-48B2-B9FB-210AF508C7D3}"/>
+              </a:ext>
+            </a:extLst>
+          </p:cNvPr>
+          <p:cNvCxnSpPr>
+            <a:cxnSpLocks/>
+          </p:cNvCxnSpPr>
+          <p:nvPr/>
+        </p:nvCxnSpPr>
+        <p:spPr>
+          <a:xfrm>
+            <a:off x="147913" y="5316069"/>
+            <a:ext cx="4538387" cy="0"/>
+          </a:xfrm>
+          <a:prstGeom prst="line">
+            <a:avLst/>
+          </a:prstGeom>
+          <a:ln>
+            <a:solidFill>
+              <a:schemeClr val="tx1"/>
+            </a:solidFill>
+          </a:ln>
+        </p:spPr>
+        <p:style>
+          <a:lnRef idx="1">
+            <a:schemeClr val="accent1"/>
+          </a:lnRef>
+          <a:fillRef idx="0">
+            <a:schemeClr val="accent1"/>
+          </a:fillRef>
+          <a:effectRef idx="0">
+            <a:schemeClr val="accent1"/>
+          </a:effectRef>
+          <a:fontRef idx="minor">
+            <a:schemeClr val="tx1"/>
+          </a:fontRef>
+        </p:style>
+      </p:cxnSp>
+      <p:sp>
+        <p:nvSpPr>
+          <p:cNvPr id="17" name="TextBox 16">
+            <a:extLst>
+              <a:ext uri="{FF2B5EF4-FFF2-40B4-BE49-F238E27FC236}">
+                <a16:creationId xmlns:a16="http://schemas.microsoft.com/office/drawing/2014/main" id="{BAFBD948-405A-4F24-84E9-61AB20E8500A}"/>
+              </a:ext>
+            </a:extLst>
+          </p:cNvPr>
+          <p:cNvSpPr txBox="1"/>
+          <p:nvPr/>
+        </p:nvSpPr>
+        <p:spPr>
+          <a:xfrm>
+            <a:off x="6774311" y="4920726"/>
+            <a:ext cx="418387" cy="461665"/>
+          </a:xfrm>
+          <a:prstGeom prst="rect">
+            <a:avLst/>
+          </a:prstGeom>
+          <a:noFill/>
+        </p:spPr>
+        <p:txBody>
+          <a:bodyPr wrap="square" rtlCol="0">
+            <a:spAutoFit/>
+          </a:bodyPr>
+          <a:lstStyle/>
+          <a:p>
+            <a:r>
+              <a:rPr lang="en-US" sz="2400" dirty="0"/>
+              <a:t>X</a:t>
+            </a:r>
+          </a:p>
+        </p:txBody>
+      </p:sp>
+      <p:sp>
+        <p:nvSpPr>
+          <p:cNvPr id="24" name="TextBox 23">
+            <a:extLst>
+              <a:ext uri="{FF2B5EF4-FFF2-40B4-BE49-F238E27FC236}">
+                <a16:creationId xmlns:a16="http://schemas.microsoft.com/office/drawing/2014/main" id="{7F1032CF-94D6-44FD-8660-E849D7E08A7B}"/>
+              </a:ext>
+            </a:extLst>
+          </p:cNvPr>
+          <p:cNvSpPr txBox="1"/>
+          <p:nvPr/>
+        </p:nvSpPr>
+        <p:spPr>
+          <a:xfrm>
+            <a:off x="1998719" y="4929193"/>
+            <a:ext cx="418387" cy="461665"/>
+          </a:xfrm>
+          <a:prstGeom prst="rect">
+            <a:avLst/>
+          </a:prstGeom>
+          <a:noFill/>
+        </p:spPr>
+        <p:txBody>
+          <a:bodyPr wrap="square" rtlCol="0">
+            <a:spAutoFit/>
+          </a:bodyPr>
+          <a:lstStyle/>
+          <a:p>
+            <a:r>
+              <a:rPr lang="en-US" sz="2400" dirty="0"/>
+              <a:t>y</a:t>
+            </a:r>
+          </a:p>
+        </p:txBody>
+      </p:sp>
+      <p:sp>
+        <p:nvSpPr>
+          <p:cNvPr id="25" name="TextBox 24">
+            <a:extLst>
+              <a:ext uri="{FF2B5EF4-FFF2-40B4-BE49-F238E27FC236}">
+                <a16:creationId xmlns:a16="http://schemas.microsoft.com/office/drawing/2014/main" id="{C8CE420F-F7B2-4E10-BC35-A9AEB0ECEAA0}"/>
+              </a:ext>
+            </a:extLst>
+          </p:cNvPr>
+          <p:cNvSpPr txBox="1"/>
+          <p:nvPr/>
+        </p:nvSpPr>
+        <p:spPr>
+          <a:xfrm>
+            <a:off x="9453278" y="4597878"/>
+            <a:ext cx="381004" cy="461665"/>
+          </a:xfrm>
+          <a:prstGeom prst="rect">
+            <a:avLst/>
+          </a:prstGeom>
+          <a:noFill/>
+        </p:spPr>
+        <p:txBody>
+          <a:bodyPr wrap="square" rtlCol="0">
+            <a:spAutoFit/>
+          </a:bodyPr>
+          <a:lstStyle/>
+          <a:p>
+            <a:r>
+              <a:rPr lang="en-US" sz="2400" dirty="0"/>
+              <a:t>n</a:t>
+            </a:r>
+          </a:p>
+        </p:txBody>
+      </p:sp>
+      <p:sp>
+        <p:nvSpPr>
+          <p:cNvPr id="29" name="TextBox 28">
+            <a:extLst>
+              <a:ext uri="{FF2B5EF4-FFF2-40B4-BE49-F238E27FC236}">
+                <a16:creationId xmlns:a16="http://schemas.microsoft.com/office/drawing/2014/main" id="{7DA0D627-6A06-46D5-A16F-8944DFC87724}"/>
+              </a:ext>
+            </a:extLst>
+          </p:cNvPr>
+          <p:cNvSpPr txBox="1"/>
+          <p:nvPr/>
+        </p:nvSpPr>
+        <p:spPr>
+          <a:xfrm>
+            <a:off x="10088641" y="4659433"/>
+            <a:ext cx="2103359" cy="338554"/>
+          </a:xfrm>
+          <a:prstGeom prst="rect">
+            <a:avLst/>
+          </a:prstGeom>
+          <a:noFill/>
+        </p:spPr>
+        <p:txBody>
+          <a:bodyPr wrap="square" rtlCol="0">
+            <a:spAutoFit/>
+          </a:bodyPr>
+          <a:lstStyle/>
+          <a:p>
+            <a:pPr algn="ctr"/>
+            <a:r>
+              <a:rPr lang="en-US" sz="1600" dirty="0"/>
+              <a:t>number of data points</a:t>
+            </a:r>
+          </a:p>
+        </p:txBody>
+      </p:sp>
+      <p:cxnSp>
+        <p:nvCxnSpPr>
+          <p:cNvPr id="30" name="Straight Arrow Connector 29">
+            <a:extLst>
+              <a:ext uri="{FF2B5EF4-FFF2-40B4-BE49-F238E27FC236}">
+                <a16:creationId xmlns:a16="http://schemas.microsoft.com/office/drawing/2014/main" id="{80BB4419-E7DB-4ED2-8AB0-F41973C4BCFE}"/>
+              </a:ext>
+            </a:extLst>
+          </p:cNvPr>
+          <p:cNvCxnSpPr>
+            <a:cxnSpLocks/>
+          </p:cNvCxnSpPr>
+          <p:nvPr/>
+        </p:nvCxnSpPr>
+        <p:spPr>
+          <a:xfrm>
+            <a:off x="9775268" y="4828710"/>
+            <a:ext cx="358198" cy="0"/>
+          </a:xfrm>
+          <a:prstGeom prst="straightConnector1">
+            <a:avLst/>
+          </a:prstGeom>
+          <a:ln>
+            <a:tailEnd type="triangle"/>
+          </a:ln>
+        </p:spPr>
+        <p:style>
+          <a:lnRef idx="1">
+            <a:schemeClr val="dk1"/>
+          </a:lnRef>
+          <a:fillRef idx="0">
+            <a:schemeClr val="dk1"/>
+          </a:fillRef>
+          <a:effectRef idx="0">
+            <a:schemeClr val="dk1"/>
+          </a:effectRef>
+          <a:fontRef idx="minor">
+            <a:schemeClr val="tx1"/>
+          </a:fontRef>
+        </p:style>
+      </p:cxnSp>
+      <p:sp>
+        <p:nvSpPr>
+          <p:cNvPr id="31" name="TextBox 30">
+            <a:extLst>
+              <a:ext uri="{FF2B5EF4-FFF2-40B4-BE49-F238E27FC236}">
+                <a16:creationId xmlns:a16="http://schemas.microsoft.com/office/drawing/2014/main" id="{1229B3D1-C388-4821-BB9A-A44E18AA63F8}"/>
+              </a:ext>
+            </a:extLst>
+          </p:cNvPr>
+          <p:cNvSpPr txBox="1"/>
+          <p:nvPr/>
+        </p:nvSpPr>
+        <p:spPr>
+          <a:xfrm>
+            <a:off x="951003" y="5518641"/>
+            <a:ext cx="7600577" cy="646331"/>
+          </a:xfrm>
+          <a:prstGeom prst="rect">
+            <a:avLst/>
+          </a:prstGeom>
+          <a:noFill/>
+        </p:spPr>
+        <p:txBody>
+          <a:bodyPr wrap="square" rtlCol="0">
+            <a:spAutoFit/>
+          </a:bodyPr>
+          <a:lstStyle/>
+          <a:p>
+            <a:pPr algn="ctr"/>
+            <a:r>
+              <a:rPr lang="en-US"/>
+              <a:t>There are machine learning algorithms that support multioutput predictions (e.g., linear regression, k-nearest neighbor, decision tree, etc.). </a:t>
+            </a:r>
+            <a:endParaRPr lang="en-US" dirty="0"/>
+          </a:p>
+        </p:txBody>
+      </p:sp>
+      <p:sp>
+        <p:nvSpPr>
+          <p:cNvPr id="36" name="TextBox 35">
+            <a:extLst>
+              <a:ext uri="{FF2B5EF4-FFF2-40B4-BE49-F238E27FC236}">
+                <a16:creationId xmlns:a16="http://schemas.microsoft.com/office/drawing/2014/main" id="{713B003F-AB54-4D32-9F0F-74F67B374230}"/>
+              </a:ext>
+            </a:extLst>
+          </p:cNvPr>
+          <p:cNvSpPr txBox="1"/>
+          <p:nvPr/>
+        </p:nvSpPr>
+        <p:spPr>
+          <a:xfrm>
+            <a:off x="3827130" y="6225772"/>
+            <a:ext cx="8106335" cy="369332"/>
+          </a:xfrm>
+          <a:prstGeom prst="rect">
+            <a:avLst/>
+          </a:prstGeom>
+          <a:noFill/>
+        </p:spPr>
+        <p:txBody>
+          <a:bodyPr wrap="square">
+            <a:spAutoFit/>
+          </a:bodyPr>
+          <a:lstStyle/>
+          <a:p>
+            <a:r>
+              <a:rPr lang="en-US" dirty="0">
+                <a:solidFill>
+                  <a:schemeClr val="accent1"/>
+                </a:solidFill>
+              </a:rPr>
+              <a:t>https://machinelearningmastery.com/multi-output-regression-models-with-python</a:t>
+            </a:r>
+          </a:p>
+        </p:txBody>
+      </p:sp>
+      <p:cxnSp>
+        <p:nvCxnSpPr>
+          <p:cNvPr id="34" name="Straight Connector 33">
+            <a:extLst>
+              <a:ext uri="{FF2B5EF4-FFF2-40B4-BE49-F238E27FC236}">
+                <a16:creationId xmlns:a16="http://schemas.microsoft.com/office/drawing/2014/main" id="{C150F9A1-71E6-454D-9F6F-5EC6C23A7C05}"/>
+              </a:ext>
+            </a:extLst>
+          </p:cNvPr>
+          <p:cNvCxnSpPr/>
+          <p:nvPr/>
+        </p:nvCxnSpPr>
+        <p:spPr>
+          <a:xfrm>
+            <a:off x="3146612" y="6137525"/>
+            <a:ext cx="0" cy="272913"/>
+          </a:xfrm>
+          <a:prstGeom prst="line">
+            <a:avLst/>
+          </a:prstGeom>
+        </p:spPr>
+        <p:style>
+          <a:lnRef idx="1">
+            <a:schemeClr val="dk1"/>
+          </a:lnRef>
+          <a:fillRef idx="0">
+            <a:schemeClr val="dk1"/>
+          </a:fillRef>
+          <a:effectRef idx="0">
+            <a:schemeClr val="dk1"/>
+          </a:effectRef>
+          <a:fontRef idx="minor">
+            <a:schemeClr val="tx1"/>
+          </a:fontRef>
+        </p:style>
+      </p:cxnSp>
+      <p:cxnSp>
+        <p:nvCxnSpPr>
+          <p:cNvPr id="39" name="Straight Connector 38">
+            <a:extLst>
+              <a:ext uri="{FF2B5EF4-FFF2-40B4-BE49-F238E27FC236}">
+                <a16:creationId xmlns:a16="http://schemas.microsoft.com/office/drawing/2014/main" id="{69F8DFA9-7FFA-456D-BF5B-D215F6534EF1}"/>
+              </a:ext>
+            </a:extLst>
+          </p:cNvPr>
+          <p:cNvCxnSpPr/>
+          <p:nvPr/>
+        </p:nvCxnSpPr>
+        <p:spPr>
+          <a:xfrm>
+            <a:off x="3146612" y="6410438"/>
+            <a:ext cx="605882" cy="0"/>
+          </a:xfrm>
+          <a:prstGeom prst="line">
+            <a:avLst/>
+          </a:prstGeom>
+          <a:ln>
+            <a:tailEnd type="triangle"/>
+          </a:ln>
+        </p:spPr>
+        <p:style>
+          <a:lnRef idx="1">
+            <a:schemeClr val="dk1"/>
+          </a:lnRef>
+          <a:fillRef idx="0">
+            <a:schemeClr val="dk1"/>
+          </a:fillRef>
+          <a:effectRef idx="0">
+            <a:schemeClr val="dk1"/>
+          </a:effectRef>
+          <a:fontRef idx="minor">
+            <a:schemeClr val="tx1"/>
+          </a:fontRef>
+        </p:style>
+      </p:cxnSp>
     </p:spTree>
     <p:extLst>
       <p:ext uri="{BB962C8B-B14F-4D97-AF65-F5344CB8AC3E}">
         <p14:creationId xmlns:p14="http://schemas.microsoft.com/office/powerpoint/2010/main" val="807876865"/>
+      </p:ext>
+    </p:extLst>
+  </p:cSld>
+  <p:clrMapOvr>
+    <a:masterClrMapping/>
+  </p:clrMapOvr>
+</p:sld>
+</file>
+
+<file path=ppt/slides/slide7.xml><?xml version="1.0" encoding="utf-8"?>
+<p:sld xmlns:a="http://schemas.openxmlformats.org/drawingml/2006/main" xmlns:r="http://schemas.openxmlformats.org/officeDocument/2006/relationships" xmlns:p="http://schemas.openxmlformats.org/presentationml/2006/main">
+  <p:cSld>
+    <p:spTree>
+      <p:nvGrpSpPr>
+        <p:cNvPr id="1" name=""/>
+        <p:cNvGrpSpPr/>
+        <p:nvPr/>
+      </p:nvGrpSpPr>
+      <p:grpSpPr>
+        <a:xfrm>
+          <a:off x="0" y="0"/>
+          <a:ext cx="0" cy="0"/>
+          <a:chOff x="0" y="0"/>
+          <a:chExt cx="0" cy="0"/>
+        </a:xfrm>
+      </p:grpSpPr>
+      <p:sp>
+        <p:nvSpPr>
+          <p:cNvPr id="2" name="Title 1">
+            <a:extLst>
+              <a:ext uri="{FF2B5EF4-FFF2-40B4-BE49-F238E27FC236}">
+                <a16:creationId xmlns:a16="http://schemas.microsoft.com/office/drawing/2014/main" id="{EAB4C2F3-4F70-4283-9A80-4338A0A2701D}"/>
+              </a:ext>
+            </a:extLst>
+          </p:cNvPr>
+          <p:cNvSpPr>
+            <a:spLocks noGrp="1"/>
+          </p:cNvSpPr>
+          <p:nvPr>
+            <p:ph type="title"/>
+          </p:nvPr>
+        </p:nvSpPr>
+        <p:spPr/>
+        <p:txBody>
+          <a:bodyPr/>
+          <a:lstStyle/>
+          <a:p>
+            <a:r>
+              <a:rPr lang="en-US" b="1" dirty="0"/>
+              <a:t>Developed data collection plan</a:t>
+            </a:r>
+          </a:p>
+        </p:txBody>
+      </p:sp>
+      <p:sp>
+        <p:nvSpPr>
+          <p:cNvPr id="6" name="TextBox 5">
+            <a:extLst>
+              <a:ext uri="{FF2B5EF4-FFF2-40B4-BE49-F238E27FC236}">
+                <a16:creationId xmlns:a16="http://schemas.microsoft.com/office/drawing/2014/main" id="{55FF3FE9-A4C1-4D69-9C7E-DC4C8B81CB94}"/>
+              </a:ext>
+            </a:extLst>
+          </p:cNvPr>
+          <p:cNvSpPr txBox="1"/>
+          <p:nvPr/>
+        </p:nvSpPr>
+        <p:spPr>
+          <a:xfrm>
+            <a:off x="1156448" y="1874728"/>
+            <a:ext cx="10089776" cy="3108543"/>
+          </a:xfrm>
+          <a:prstGeom prst="rect">
+            <a:avLst/>
+          </a:prstGeom>
+          <a:noFill/>
+        </p:spPr>
+        <p:txBody>
+          <a:bodyPr wrap="square" rtlCol="0">
+            <a:spAutoFit/>
+          </a:bodyPr>
+          <a:lstStyle/>
+          <a:p>
+            <a:pPr marL="285750" indent="-285750">
+              <a:buFont typeface="Arial" panose="020B0604020202020204" pitchFamily="34" charset="0"/>
+              <a:buChar char="•"/>
+            </a:pPr>
+            <a:r>
+              <a:rPr lang="en-US" sz="2800" dirty="0"/>
+              <a:t>Acquire high SNR MSOT spectra at 1 mm wavelength steps between 680 nm to 900 nm. </a:t>
+            </a:r>
+          </a:p>
+          <a:p>
+            <a:pPr marL="914400" lvl="1" indent="-457200">
+              <a:buFont typeface="Courier New" panose="02070309020205020404" pitchFamily="49" charset="0"/>
+              <a:buChar char="o"/>
+            </a:pPr>
+            <a:endParaRPr lang="en-US" sz="2800" dirty="0"/>
+          </a:p>
+          <a:p>
+            <a:pPr marL="457200" indent="-457200">
+              <a:buFont typeface="Arial" panose="020B0604020202020204" pitchFamily="34" charset="0"/>
+              <a:buChar char="•"/>
+            </a:pPr>
+            <a:r>
+              <a:rPr lang="en-US" sz="2800" dirty="0">
+                <a:solidFill>
+                  <a:srgbClr val="FF0000"/>
+                </a:solidFill>
+              </a:rPr>
+              <a:t>X</a:t>
+            </a:r>
+            <a:r>
+              <a:rPr lang="en-US" sz="2800" dirty="0"/>
+              <a:t> MSOT spectra will be collected at </a:t>
+            </a:r>
+            <a:r>
+              <a:rPr lang="en-US" sz="2800" dirty="0">
+                <a:solidFill>
+                  <a:srgbClr val="FF0000"/>
+                </a:solidFill>
+              </a:rPr>
+              <a:t>X</a:t>
+            </a:r>
+            <a:r>
+              <a:rPr lang="en-US" sz="2800" dirty="0"/>
+              <a:t> different mixtures of Hb, O2, and ICG.</a:t>
+            </a:r>
+          </a:p>
+          <a:p>
+            <a:pPr marL="457200" indent="-457200">
+              <a:buFont typeface="Arial" panose="020B0604020202020204" pitchFamily="34" charset="0"/>
+              <a:buChar char="•"/>
+            </a:pPr>
+            <a:endParaRPr lang="en-US" sz="2800" dirty="0"/>
+          </a:p>
+          <a:p>
+            <a:pPr marL="457200" indent="-457200">
+              <a:buFont typeface="Arial" panose="020B0604020202020204" pitchFamily="34" charset="0"/>
+              <a:buChar char="•"/>
+            </a:pPr>
+            <a:r>
+              <a:rPr lang="en-US" sz="2800" dirty="0"/>
+              <a:t>Data will be collected by </a:t>
+            </a:r>
+            <a:r>
+              <a:rPr lang="en-US" sz="2800" dirty="0">
+                <a:solidFill>
+                  <a:srgbClr val="FF0000"/>
+                </a:solidFill>
+              </a:rPr>
+              <a:t>X</a:t>
+            </a:r>
+          </a:p>
+        </p:txBody>
+      </p:sp>
+    </p:spTree>
+    <p:extLst>
+      <p:ext uri="{BB962C8B-B14F-4D97-AF65-F5344CB8AC3E}">
+        <p14:creationId xmlns:p14="http://schemas.microsoft.com/office/powerpoint/2010/main" val="1757204623"/>
+      </p:ext>
+    </p:extLst>
+  </p:cSld>
+  <p:clrMapOvr>
+    <a:masterClrMapping/>
+  </p:clrMapOvr>
+</p:sld>
+</file>
+
+<file path=ppt/slides/slide8.xml><?xml version="1.0" encoding="utf-8"?>
+<p:sld xmlns:a="http://schemas.openxmlformats.org/drawingml/2006/main" xmlns:r="http://schemas.openxmlformats.org/officeDocument/2006/relationships" xmlns:p="http://schemas.openxmlformats.org/presentationml/2006/main">
+  <p:cSld>
+    <p:spTree>
+      <p:nvGrpSpPr>
+        <p:cNvPr id="1" name=""/>
+        <p:cNvGrpSpPr/>
+        <p:nvPr/>
+      </p:nvGrpSpPr>
+      <p:grpSpPr>
+        <a:xfrm>
+          <a:off x="0" y="0"/>
+          <a:ext cx="0" cy="0"/>
+          <a:chOff x="0" y="0"/>
+          <a:chExt cx="0" cy="0"/>
+        </a:xfrm>
+      </p:grpSpPr>
+      <p:sp>
+        <p:nvSpPr>
+          <p:cNvPr id="2" name="Title 1">
+            <a:extLst>
+              <a:ext uri="{FF2B5EF4-FFF2-40B4-BE49-F238E27FC236}">
+                <a16:creationId xmlns:a16="http://schemas.microsoft.com/office/drawing/2014/main" id="{EAB4C2F3-4F70-4283-9A80-4338A0A2701D}"/>
+              </a:ext>
+            </a:extLst>
+          </p:cNvPr>
+          <p:cNvSpPr>
+            <a:spLocks noGrp="1"/>
+          </p:cNvSpPr>
+          <p:nvPr>
+            <p:ph type="title"/>
+          </p:nvPr>
+        </p:nvSpPr>
+        <p:spPr>
+          <a:xfrm>
+            <a:off x="2926977" y="2382183"/>
+            <a:ext cx="6485965" cy="1325563"/>
+          </a:xfrm>
+        </p:spPr>
+        <p:txBody>
+          <a:bodyPr/>
+          <a:lstStyle/>
+          <a:p>
+            <a:r>
+              <a:rPr lang="en-US" b="1" dirty="0"/>
+              <a:t>Plans after data is collected?</a:t>
+            </a:r>
+          </a:p>
+        </p:txBody>
+      </p:sp>
+    </p:spTree>
+    <p:extLst>
+      <p:ext uri="{BB962C8B-B14F-4D97-AF65-F5344CB8AC3E}">
+        <p14:creationId xmlns:p14="http://schemas.microsoft.com/office/powerpoint/2010/main" val="3641404996"/>
+      </p:ext>
+    </p:extLst>
+  </p:cSld>
+  <p:clrMapOvr>
+    <a:masterClrMapping/>
+  </p:clrMapOvr>
+</p:sld>
+</file>
+
+<file path=ppt/slides/slide9.xml><?xml version="1.0" encoding="utf-8"?>
+<p:sld xmlns:a="http://schemas.openxmlformats.org/drawingml/2006/main" xmlns:r="http://schemas.openxmlformats.org/officeDocument/2006/relationships" xmlns:p="http://schemas.openxmlformats.org/presentationml/2006/main">
+  <p:cSld>
+    <p:spTree>
+      <p:nvGrpSpPr>
+        <p:cNvPr id="1" name=""/>
+        <p:cNvGrpSpPr/>
+        <p:nvPr/>
+      </p:nvGrpSpPr>
+      <p:grpSpPr>
+        <a:xfrm>
+          <a:off x="0" y="0"/>
+          <a:ext cx="0" cy="0"/>
+          <a:chOff x="0" y="0"/>
+          <a:chExt cx="0" cy="0"/>
+        </a:xfrm>
+      </p:grpSpPr>
+      <p:sp>
+        <p:nvSpPr>
+          <p:cNvPr id="2" name="Title 1">
+            <a:extLst>
+              <a:ext uri="{FF2B5EF4-FFF2-40B4-BE49-F238E27FC236}">
+                <a16:creationId xmlns:a16="http://schemas.microsoft.com/office/drawing/2014/main" id="{EAB4C2F3-4F70-4283-9A80-4338A0A2701D}"/>
+              </a:ext>
+            </a:extLst>
+          </p:cNvPr>
+          <p:cNvSpPr>
+            <a:spLocks noGrp="1"/>
+          </p:cNvSpPr>
+          <p:nvPr>
+            <p:ph type="title"/>
+          </p:nvPr>
+        </p:nvSpPr>
+        <p:spPr/>
+        <p:txBody>
+          <a:bodyPr/>
+          <a:lstStyle/>
+          <a:p>
+            <a:r>
+              <a:rPr lang="en-US" b="1" dirty="0"/>
+              <a:t>Machine learning vs. traditional method</a:t>
+            </a:r>
+          </a:p>
+        </p:txBody>
+      </p:sp>
+      <p:sp>
+        <p:nvSpPr>
+          <p:cNvPr id="3" name="Content Placeholder 2">
+            <a:extLst>
+              <a:ext uri="{FF2B5EF4-FFF2-40B4-BE49-F238E27FC236}">
+                <a16:creationId xmlns:a16="http://schemas.microsoft.com/office/drawing/2014/main" id="{7E7EA47C-BB5D-4E88-AB59-70CAA858D8B0}"/>
+              </a:ext>
+            </a:extLst>
+          </p:cNvPr>
+          <p:cNvSpPr>
+            <a:spLocks noGrp="1"/>
+          </p:cNvSpPr>
+          <p:nvPr>
+            <p:ph idx="1"/>
+          </p:nvPr>
+        </p:nvSpPr>
+        <p:spPr>
+          <a:xfrm>
+            <a:off x="838200" y="1497107"/>
+            <a:ext cx="10515600" cy="4995768"/>
+          </a:xfrm>
+        </p:spPr>
+        <p:txBody>
+          <a:bodyPr>
+            <a:normAutofit/>
+          </a:bodyPr>
+          <a:lstStyle/>
+          <a:p>
+            <a:pPr marL="0" indent="0">
+              <a:buNone/>
+            </a:pPr>
+            <a:endParaRPr lang="en-US" dirty="0"/>
+          </a:p>
+        </p:txBody>
+      </p:sp>
+    </p:spTree>
+    <p:extLst>
+      <p:ext uri="{BB962C8B-B14F-4D97-AF65-F5344CB8AC3E}">
+        <p14:creationId xmlns:p14="http://schemas.microsoft.com/office/powerpoint/2010/main" val="1021032332"/>
       </p:ext>
     </p:extLst>
   </p:cSld>

</xml_diff>